<commit_message>
More assets added/updated for presentation
</commit_message>
<xml_diff>
--- a/NoSQLWhirlwind supprting images.pptx
+++ b/NoSQLWhirlwind supprting images.pptx
@@ -43,22 +43,22 @@
     <p:sldId id="273" r:id="rId34"/>
     <p:sldId id="284" r:id="rId35"/>
     <p:sldId id="275" r:id="rId36"/>
-    <p:sldId id="269" r:id="rId37"/>
-    <p:sldId id="270" r:id="rId38"/>
-    <p:sldId id="271" r:id="rId39"/>
-    <p:sldId id="320" r:id="rId40"/>
-    <p:sldId id="321" r:id="rId41"/>
-    <p:sldId id="322" r:id="rId42"/>
-    <p:sldId id="323" r:id="rId43"/>
-    <p:sldId id="324" r:id="rId44"/>
-    <p:sldId id="278" r:id="rId45"/>
-    <p:sldId id="301" r:id="rId46"/>
-    <p:sldId id="311" r:id="rId47"/>
-    <p:sldId id="307" r:id="rId48"/>
-    <p:sldId id="312" r:id="rId49"/>
-    <p:sldId id="313" r:id="rId50"/>
-    <p:sldId id="314" r:id="rId51"/>
-    <p:sldId id="306" r:id="rId52"/>
+    <p:sldId id="306" r:id="rId37"/>
+    <p:sldId id="269" r:id="rId38"/>
+    <p:sldId id="270" r:id="rId39"/>
+    <p:sldId id="271" r:id="rId40"/>
+    <p:sldId id="320" r:id="rId41"/>
+    <p:sldId id="321" r:id="rId42"/>
+    <p:sldId id="322" r:id="rId43"/>
+    <p:sldId id="323" r:id="rId44"/>
+    <p:sldId id="324" r:id="rId45"/>
+    <p:sldId id="278" r:id="rId46"/>
+    <p:sldId id="301" r:id="rId47"/>
+    <p:sldId id="311" r:id="rId48"/>
+    <p:sldId id="307" r:id="rId49"/>
+    <p:sldId id="312" r:id="rId50"/>
+    <p:sldId id="313" r:id="rId51"/>
+    <p:sldId id="314" r:id="rId52"/>
     <p:sldId id="302" r:id="rId53"/>
   </p:sldIdLst>
   <p:sldSz cx="12192000" cy="6858000"/>
@@ -234,6 +234,7 @@
         <p14:section name="Graph Database" id="{FE2C71D0-3BBB-4CC9-988D-A3E496CEC6F2}">
           <p14:sldIdLst>
             <p14:sldId id="275"/>
+            <p14:sldId id="306"/>
           </p14:sldIdLst>
         </p14:section>
         <p14:section name="Wide Column DB" id="{56818F84-F7F7-4068-8407-49102792611D}">
@@ -253,7 +254,6 @@
             <p14:sldId id="312"/>
             <p14:sldId id="313"/>
             <p14:sldId id="314"/>
-            <p14:sldId id="306"/>
             <p14:sldId id="302"/>
           </p14:sldIdLst>
         </p14:section>
@@ -359,7 +359,7 @@
           <a:p>
             <a:fld id="{09204D5E-80CA-44E6-9838-6D2C437BFBFD}" type="datetimeFigureOut">
               <a:rPr lang="en-US" smtClean="0"/>
-              <a:t>4/2/2016</a:t>
+              <a:t>4/3/2016</a:t>
             </a:fld>
             <a:endParaRPr lang="en-US"/>
           </a:p>
@@ -2133,7 +2133,7 @@
           <a:p>
             <a:fld id="{7D161F0C-C389-4F4C-A9F9-4D86F194D20A}" type="datetimeFigureOut">
               <a:rPr lang="en-US" smtClean="0"/>
-              <a:t>4/2/2016</a:t>
+              <a:t>4/3/2016</a:t>
             </a:fld>
             <a:endParaRPr lang="en-US"/>
           </a:p>
@@ -2303,7 +2303,7 @@
           <a:p>
             <a:fld id="{7D161F0C-C389-4F4C-A9F9-4D86F194D20A}" type="datetimeFigureOut">
               <a:rPr lang="en-US" smtClean="0"/>
-              <a:t>4/2/2016</a:t>
+              <a:t>4/3/2016</a:t>
             </a:fld>
             <a:endParaRPr lang="en-US"/>
           </a:p>
@@ -2483,7 +2483,7 @@
           <a:p>
             <a:fld id="{7D161F0C-C389-4F4C-A9F9-4D86F194D20A}" type="datetimeFigureOut">
               <a:rPr lang="en-US" smtClean="0"/>
-              <a:t>4/2/2016</a:t>
+              <a:t>4/3/2016</a:t>
             </a:fld>
             <a:endParaRPr lang="en-US"/>
           </a:p>
@@ -2653,7 +2653,7 @@
           <a:p>
             <a:fld id="{7D161F0C-C389-4F4C-A9F9-4D86F194D20A}" type="datetimeFigureOut">
               <a:rPr lang="en-US" smtClean="0"/>
-              <a:t>4/2/2016</a:t>
+              <a:t>4/3/2016</a:t>
             </a:fld>
             <a:endParaRPr lang="en-US"/>
           </a:p>
@@ -2899,7 +2899,7 @@
           <a:p>
             <a:fld id="{7D161F0C-C389-4F4C-A9F9-4D86F194D20A}" type="datetimeFigureOut">
               <a:rPr lang="en-US" smtClean="0"/>
-              <a:t>4/2/2016</a:t>
+              <a:t>4/3/2016</a:t>
             </a:fld>
             <a:endParaRPr lang="en-US"/>
           </a:p>
@@ -3131,7 +3131,7 @@
           <a:p>
             <a:fld id="{7D161F0C-C389-4F4C-A9F9-4D86F194D20A}" type="datetimeFigureOut">
               <a:rPr lang="en-US" smtClean="0"/>
-              <a:t>4/2/2016</a:t>
+              <a:t>4/3/2016</a:t>
             </a:fld>
             <a:endParaRPr lang="en-US"/>
           </a:p>
@@ -3498,7 +3498,7 @@
           <a:p>
             <a:fld id="{7D161F0C-C389-4F4C-A9F9-4D86F194D20A}" type="datetimeFigureOut">
               <a:rPr lang="en-US" smtClean="0"/>
-              <a:t>4/2/2016</a:t>
+              <a:t>4/3/2016</a:t>
             </a:fld>
             <a:endParaRPr lang="en-US"/>
           </a:p>
@@ -3616,7 +3616,7 @@
           <a:p>
             <a:fld id="{7D161F0C-C389-4F4C-A9F9-4D86F194D20A}" type="datetimeFigureOut">
               <a:rPr lang="en-US" smtClean="0"/>
-              <a:t>4/2/2016</a:t>
+              <a:t>4/3/2016</a:t>
             </a:fld>
             <a:endParaRPr lang="en-US"/>
           </a:p>
@@ -3711,7 +3711,7 @@
           <a:p>
             <a:fld id="{7D161F0C-C389-4F4C-A9F9-4D86F194D20A}" type="datetimeFigureOut">
               <a:rPr lang="en-US" smtClean="0"/>
-              <a:t>4/2/2016</a:t>
+              <a:t>4/3/2016</a:t>
             </a:fld>
             <a:endParaRPr lang="en-US"/>
           </a:p>
@@ -3988,7 +3988,7 @@
           <a:p>
             <a:fld id="{7D161F0C-C389-4F4C-A9F9-4D86F194D20A}" type="datetimeFigureOut">
               <a:rPr lang="en-US" smtClean="0"/>
-              <a:t>4/2/2016</a:t>
+              <a:t>4/3/2016</a:t>
             </a:fld>
             <a:endParaRPr lang="en-US"/>
           </a:p>
@@ -4245,7 +4245,7 @@
           <a:p>
             <a:fld id="{7D161F0C-C389-4F4C-A9F9-4D86F194D20A}" type="datetimeFigureOut">
               <a:rPr lang="en-US" smtClean="0"/>
-              <a:t>4/2/2016</a:t>
+              <a:t>4/3/2016</a:t>
             </a:fld>
             <a:endParaRPr lang="en-US"/>
           </a:p>
@@ -4458,7 +4458,7 @@
           <a:p>
             <a:fld id="{7D161F0C-C389-4F4C-A9F9-4D86F194D20A}" type="datetimeFigureOut">
               <a:rPr lang="en-US" smtClean="0"/>
-              <a:t>4/2/2016</a:t>
+              <a:t>4/3/2016</a:t>
             </a:fld>
             <a:endParaRPr lang="en-US"/>
           </a:p>
@@ -6608,14 +6608,14 @@
           </a:effectLst>
           <a:extLst>
             <a:ext uri="{909E8E84-426E-40dd-AFC4-6F175D3DCCD1}">
-              <a14:hiddenFill xmlns="" xmlns:a14="http://schemas.microsoft.com/office/drawing/2010/main">
+              <a14:hiddenFill xmlns:a14="http://schemas.microsoft.com/office/drawing/2010/main" xmlns="">
                 <a:solidFill>
                   <a:schemeClr val="accent1"/>
                 </a:solidFill>
               </a14:hiddenFill>
             </a:ext>
             <a:ext uri="{91240B29-F687-4f45-9708-019B960494DF}">
-              <a14:hiddenLine xmlns="" xmlns:a14="http://schemas.microsoft.com/office/drawing/2010/main" w="9525">
+              <a14:hiddenLine xmlns:a14="http://schemas.microsoft.com/office/drawing/2010/main" xmlns="" w="9525">
                 <a:solidFill>
                   <a:schemeClr val="tx1"/>
                 </a:solidFill>
@@ -7110,14 +7110,14 @@
           </a:ln>
           <a:extLst>
             <a:ext uri="{909E8E84-426E-40dd-AFC4-6F175D3DCCD1}">
-              <a14:hiddenFill xmlns="" xmlns:a14="http://schemas.microsoft.com/office/drawing/2010/main">
+              <a14:hiddenFill xmlns:a14="http://schemas.microsoft.com/office/drawing/2010/main" xmlns="">
                 <a:solidFill>
                   <a:schemeClr val="accent1"/>
                 </a:solidFill>
               </a14:hiddenFill>
             </a:ext>
             <a:ext uri="{91240B29-F687-4f45-9708-019B960494DF}">
-              <a14:hiddenLine xmlns="" xmlns:a14="http://schemas.microsoft.com/office/drawing/2010/main" w="9525">
+              <a14:hiddenLine xmlns:a14="http://schemas.microsoft.com/office/drawing/2010/main" xmlns="" w="9525">
                 <a:solidFill>
                   <a:schemeClr val="tx1"/>
                 </a:solidFill>
@@ -14209,6 +14209,545 @@
           <a:chExt cx="0" cy="0"/>
         </a:xfrm>
       </p:grpSpPr>
+      <p:cxnSp>
+        <p:nvCxnSpPr>
+          <p:cNvPr id="6" name="Straight Arrow Connector 5"/>
+          <p:cNvCxnSpPr/>
+          <p:nvPr/>
+        </p:nvCxnSpPr>
+        <p:spPr>
+          <a:xfrm flipH="1" flipV="1">
+            <a:off x="2691581" y="609600"/>
+            <a:ext cx="5532" cy="4387646"/>
+          </a:xfrm>
+          <a:prstGeom prst="straightConnector1">
+            <a:avLst/>
+          </a:prstGeom>
+          <a:ln w="63500">
+            <a:tailEnd type="triangle"/>
+          </a:ln>
+        </p:spPr>
+        <p:style>
+          <a:lnRef idx="1">
+            <a:schemeClr val="accent1"/>
+          </a:lnRef>
+          <a:fillRef idx="0">
+            <a:schemeClr val="accent1"/>
+          </a:fillRef>
+          <a:effectRef idx="0">
+            <a:schemeClr val="accent1"/>
+          </a:effectRef>
+          <a:fontRef idx="minor">
+            <a:schemeClr val="tx1"/>
+          </a:fontRef>
+        </p:style>
+      </p:cxnSp>
+      <p:cxnSp>
+        <p:nvCxnSpPr>
+          <p:cNvPr id="7" name="Straight Arrow Connector 6"/>
+          <p:cNvCxnSpPr/>
+          <p:nvPr/>
+        </p:nvCxnSpPr>
+        <p:spPr>
+          <a:xfrm>
+            <a:off x="2691581" y="4997245"/>
+            <a:ext cx="6655619" cy="1"/>
+          </a:xfrm>
+          <a:prstGeom prst="straightConnector1">
+            <a:avLst/>
+          </a:prstGeom>
+          <a:ln w="63500">
+            <a:tailEnd type="triangle"/>
+          </a:ln>
+        </p:spPr>
+        <p:style>
+          <a:lnRef idx="1">
+            <a:schemeClr val="accent1"/>
+          </a:lnRef>
+          <a:fillRef idx="0">
+            <a:schemeClr val="accent1"/>
+          </a:fillRef>
+          <a:effectRef idx="0">
+            <a:schemeClr val="accent1"/>
+          </a:effectRef>
+          <a:fontRef idx="minor">
+            <a:schemeClr val="tx1"/>
+          </a:fontRef>
+        </p:style>
+      </p:cxnSp>
+      <p:sp>
+        <p:nvSpPr>
+          <p:cNvPr id="13" name="TextBox 12"/>
+          <p:cNvSpPr txBox="1"/>
+          <p:nvPr/>
+        </p:nvSpPr>
+        <p:spPr>
+          <a:xfrm rot="16200000">
+            <a:off x="1481931" y="1315423"/>
+            <a:ext cx="1541704" cy="523220"/>
+          </a:xfrm>
+          <a:prstGeom prst="rect">
+            <a:avLst/>
+          </a:prstGeom>
+          <a:noFill/>
+        </p:spPr>
+        <p:txBody>
+          <a:bodyPr wrap="none" rtlCol="0">
+            <a:spAutoFit/>
+          </a:bodyPr>
+          <a:lstStyle/>
+          <a:p>
+            <a:r>
+              <a:rPr lang="en-US" sz="2800" b="1" dirty="0"/>
+              <a:t>Data Size</a:t>
+            </a:r>
+          </a:p>
+        </p:txBody>
+      </p:sp>
+      <p:sp>
+        <p:nvSpPr>
+          <p:cNvPr id="16" name="TextBox 15"/>
+          <p:cNvSpPr txBox="1"/>
+          <p:nvPr/>
+        </p:nvSpPr>
+        <p:spPr>
+          <a:xfrm>
+            <a:off x="6515100" y="5092700"/>
+            <a:ext cx="2632772" cy="523220"/>
+          </a:xfrm>
+          <a:prstGeom prst="rect">
+            <a:avLst/>
+          </a:prstGeom>
+          <a:noFill/>
+        </p:spPr>
+        <p:txBody>
+          <a:bodyPr wrap="none" rtlCol="0">
+            <a:spAutoFit/>
+          </a:bodyPr>
+          <a:lstStyle/>
+          <a:p>
+            <a:r>
+              <a:rPr lang="en-US" sz="2800" b="1" dirty="0"/>
+              <a:t>Data</a:t>
+            </a:r>
+            <a:r>
+              <a:rPr lang="en-US" sz="2400" b="1" dirty="0"/>
+              <a:t> </a:t>
+            </a:r>
+            <a:r>
+              <a:rPr lang="en-US" sz="2800" b="1" dirty="0"/>
+              <a:t>Complexity</a:t>
+            </a:r>
+            <a:endParaRPr lang="en-US" sz="2400" b="1" dirty="0"/>
+          </a:p>
+        </p:txBody>
+      </p:sp>
+      <p:sp>
+        <p:nvSpPr>
+          <p:cNvPr id="17" name="Oval 16"/>
+          <p:cNvSpPr/>
+          <p:nvPr/>
+        </p:nvSpPr>
+        <p:spPr>
+          <a:xfrm>
+            <a:off x="3064980" y="1189112"/>
+            <a:ext cx="457200" cy="342900"/>
+          </a:xfrm>
+          <a:prstGeom prst="ellipse">
+            <a:avLst/>
+          </a:prstGeom>
+        </p:spPr>
+        <p:style>
+          <a:lnRef idx="2">
+            <a:schemeClr val="accent1">
+              <a:shade val="50000"/>
+            </a:schemeClr>
+          </a:lnRef>
+          <a:fillRef idx="1">
+            <a:schemeClr val="accent1"/>
+          </a:fillRef>
+          <a:effectRef idx="0">
+            <a:schemeClr val="accent1"/>
+          </a:effectRef>
+          <a:fontRef idx="minor">
+            <a:schemeClr val="lt1"/>
+          </a:fontRef>
+        </p:style>
+        <p:txBody>
+          <a:bodyPr rtlCol="0" anchor="ctr"/>
+          <a:lstStyle/>
+          <a:p>
+            <a:pPr algn="ctr"/>
+            <a:endParaRPr lang="en-US"/>
+          </a:p>
+        </p:txBody>
+      </p:sp>
+      <p:sp>
+        <p:nvSpPr>
+          <p:cNvPr id="18" name="TextBox 17"/>
+          <p:cNvSpPr txBox="1"/>
+          <p:nvPr/>
+        </p:nvSpPr>
+        <p:spPr>
+          <a:xfrm>
+            <a:off x="3527281" y="1189112"/>
+            <a:ext cx="1454437" cy="461665"/>
+          </a:xfrm>
+          <a:prstGeom prst="rect">
+            <a:avLst/>
+          </a:prstGeom>
+          <a:noFill/>
+          <a:ln>
+            <a:solidFill>
+              <a:schemeClr val="accent1">
+                <a:shade val="50000"/>
+              </a:schemeClr>
+            </a:solidFill>
+          </a:ln>
+        </p:spPr>
+        <p:txBody>
+          <a:bodyPr wrap="none" rtlCol="0">
+            <a:spAutoFit/>
+          </a:bodyPr>
+          <a:lstStyle/>
+          <a:p>
+            <a:r>
+              <a:rPr lang="en-US" sz="2400" b="1" dirty="0"/>
+              <a:t>Key-Value</a:t>
+            </a:r>
+          </a:p>
+        </p:txBody>
+      </p:sp>
+      <p:sp>
+        <p:nvSpPr>
+          <p:cNvPr id="19" name="Oval 18"/>
+          <p:cNvSpPr/>
+          <p:nvPr/>
+        </p:nvSpPr>
+        <p:spPr>
+          <a:xfrm>
+            <a:off x="4254500" y="1886220"/>
+            <a:ext cx="457200" cy="342900"/>
+          </a:xfrm>
+          <a:prstGeom prst="ellipse">
+            <a:avLst/>
+          </a:prstGeom>
+        </p:spPr>
+        <p:style>
+          <a:lnRef idx="2">
+            <a:schemeClr val="accent1">
+              <a:shade val="50000"/>
+            </a:schemeClr>
+          </a:lnRef>
+          <a:fillRef idx="1">
+            <a:schemeClr val="accent1"/>
+          </a:fillRef>
+          <a:effectRef idx="0">
+            <a:schemeClr val="accent1"/>
+          </a:effectRef>
+          <a:fontRef idx="minor">
+            <a:schemeClr val="lt1"/>
+          </a:fontRef>
+        </p:style>
+        <p:txBody>
+          <a:bodyPr rtlCol="0" anchor="ctr"/>
+          <a:lstStyle/>
+          <a:p>
+            <a:pPr algn="ctr"/>
+            <a:endParaRPr lang="en-US"/>
+          </a:p>
+        </p:txBody>
+      </p:sp>
+      <p:sp>
+        <p:nvSpPr>
+          <p:cNvPr id="20" name="TextBox 19"/>
+          <p:cNvSpPr txBox="1"/>
+          <p:nvPr/>
+        </p:nvSpPr>
+        <p:spPr>
+          <a:xfrm>
+            <a:off x="4716801" y="1886220"/>
+            <a:ext cx="1430200" cy="461665"/>
+          </a:xfrm>
+          <a:prstGeom prst="rect">
+            <a:avLst/>
+          </a:prstGeom>
+          <a:noFill/>
+          <a:ln>
+            <a:solidFill>
+              <a:schemeClr val="accent1">
+                <a:shade val="50000"/>
+              </a:schemeClr>
+            </a:solidFill>
+          </a:ln>
+        </p:spPr>
+        <p:txBody>
+          <a:bodyPr wrap="none" rtlCol="0">
+            <a:spAutoFit/>
+          </a:bodyPr>
+          <a:lstStyle/>
+          <a:p>
+            <a:r>
+              <a:rPr lang="en-US" sz="2400" b="1" dirty="0"/>
+              <a:t>Columnar</a:t>
+            </a:r>
+          </a:p>
+        </p:txBody>
+      </p:sp>
+      <p:sp>
+        <p:nvSpPr>
+          <p:cNvPr id="21" name="Oval 20"/>
+          <p:cNvSpPr/>
+          <p:nvPr/>
+        </p:nvSpPr>
+        <p:spPr>
+          <a:xfrm>
+            <a:off x="7374286" y="3364589"/>
+            <a:ext cx="457200" cy="342900"/>
+          </a:xfrm>
+          <a:prstGeom prst="ellipse">
+            <a:avLst/>
+          </a:prstGeom>
+        </p:spPr>
+        <p:style>
+          <a:lnRef idx="2">
+            <a:schemeClr val="accent1">
+              <a:shade val="50000"/>
+            </a:schemeClr>
+          </a:lnRef>
+          <a:fillRef idx="1">
+            <a:schemeClr val="accent1"/>
+          </a:fillRef>
+          <a:effectRef idx="0">
+            <a:schemeClr val="accent1"/>
+          </a:effectRef>
+          <a:fontRef idx="minor">
+            <a:schemeClr val="lt1"/>
+          </a:fontRef>
+        </p:style>
+        <p:txBody>
+          <a:bodyPr rtlCol="0" anchor="ctr"/>
+          <a:lstStyle/>
+          <a:p>
+            <a:pPr algn="ctr"/>
+            <a:endParaRPr lang="en-US"/>
+          </a:p>
+        </p:txBody>
+      </p:sp>
+      <p:sp>
+        <p:nvSpPr>
+          <p:cNvPr id="22" name="TextBox 21"/>
+          <p:cNvSpPr txBox="1"/>
+          <p:nvPr/>
+        </p:nvSpPr>
+        <p:spPr>
+          <a:xfrm>
+            <a:off x="7831486" y="3287278"/>
+            <a:ext cx="965008" cy="461665"/>
+          </a:xfrm>
+          <a:prstGeom prst="rect">
+            <a:avLst/>
+          </a:prstGeom>
+          <a:noFill/>
+          <a:ln>
+            <a:solidFill>
+              <a:schemeClr val="accent1">
+                <a:shade val="50000"/>
+              </a:schemeClr>
+            </a:solidFill>
+          </a:ln>
+        </p:spPr>
+        <p:txBody>
+          <a:bodyPr wrap="none" rtlCol="0">
+            <a:spAutoFit/>
+          </a:bodyPr>
+          <a:lstStyle/>
+          <a:p>
+            <a:r>
+              <a:rPr lang="en-US" sz="2400" b="1" dirty="0"/>
+              <a:t>Graph</a:t>
+            </a:r>
+          </a:p>
+        </p:txBody>
+      </p:sp>
+      <p:sp>
+        <p:nvSpPr>
+          <p:cNvPr id="23" name="Oval 22"/>
+          <p:cNvSpPr/>
+          <p:nvPr/>
+        </p:nvSpPr>
+        <p:spPr>
+          <a:xfrm>
+            <a:off x="5544799" y="2543142"/>
+            <a:ext cx="457200" cy="342900"/>
+          </a:xfrm>
+          <a:prstGeom prst="ellipse">
+            <a:avLst/>
+          </a:prstGeom>
+        </p:spPr>
+        <p:style>
+          <a:lnRef idx="2">
+            <a:schemeClr val="accent1">
+              <a:shade val="50000"/>
+            </a:schemeClr>
+          </a:lnRef>
+          <a:fillRef idx="1">
+            <a:schemeClr val="accent1"/>
+          </a:fillRef>
+          <a:effectRef idx="0">
+            <a:schemeClr val="accent1"/>
+          </a:effectRef>
+          <a:fontRef idx="minor">
+            <a:schemeClr val="lt1"/>
+          </a:fontRef>
+        </p:style>
+        <p:txBody>
+          <a:bodyPr rtlCol="0" anchor="ctr"/>
+          <a:lstStyle/>
+          <a:p>
+            <a:pPr algn="ctr"/>
+            <a:endParaRPr lang="en-US"/>
+          </a:p>
+        </p:txBody>
+      </p:sp>
+      <p:sp>
+        <p:nvSpPr>
+          <p:cNvPr id="24" name="TextBox 23"/>
+          <p:cNvSpPr txBox="1"/>
+          <p:nvPr/>
+        </p:nvSpPr>
+        <p:spPr>
+          <a:xfrm>
+            <a:off x="6007100" y="2543142"/>
+            <a:ext cx="1512273" cy="461665"/>
+          </a:xfrm>
+          <a:prstGeom prst="rect">
+            <a:avLst/>
+          </a:prstGeom>
+          <a:noFill/>
+          <a:ln>
+            <a:solidFill>
+              <a:schemeClr val="accent1">
+                <a:shade val="50000"/>
+              </a:schemeClr>
+            </a:solidFill>
+          </a:ln>
+        </p:spPr>
+        <p:txBody>
+          <a:bodyPr wrap="none" rtlCol="0">
+            <a:spAutoFit/>
+          </a:bodyPr>
+          <a:lstStyle/>
+          <a:p>
+            <a:r>
+              <a:rPr lang="en-US" sz="2400" b="1" dirty="0"/>
+              <a:t>Document</a:t>
+            </a:r>
+          </a:p>
+        </p:txBody>
+      </p:sp>
+      <p:cxnSp>
+        <p:nvCxnSpPr>
+          <p:cNvPr id="28" name="Straight Arrow Connector 27"/>
+          <p:cNvCxnSpPr>
+            <a:stCxn id="30" idx="2"/>
+            <a:endCxn id="22" idx="0"/>
+          </p:cNvCxnSpPr>
+          <p:nvPr/>
+        </p:nvCxnSpPr>
+        <p:spPr>
+          <a:xfrm flipH="1">
+            <a:off x="8313990" y="1859526"/>
+            <a:ext cx="677204" cy="1427752"/>
+          </a:xfrm>
+          <a:prstGeom prst="straightConnector1">
+            <a:avLst/>
+          </a:prstGeom>
+          <a:ln w="50800">
+            <a:solidFill>
+              <a:srgbClr val="FF0000"/>
+            </a:solidFill>
+            <a:tailEnd type="triangle"/>
+          </a:ln>
+        </p:spPr>
+        <p:style>
+          <a:lnRef idx="1">
+            <a:schemeClr val="accent1"/>
+          </a:lnRef>
+          <a:fillRef idx="0">
+            <a:schemeClr val="accent1"/>
+          </a:fillRef>
+          <a:effectRef idx="0">
+            <a:schemeClr val="accent1"/>
+          </a:effectRef>
+          <a:fontRef idx="minor">
+            <a:schemeClr val="tx1"/>
+          </a:fontRef>
+        </p:style>
+      </p:cxnSp>
+      <p:sp>
+        <p:nvSpPr>
+          <p:cNvPr id="30" name="TextBox 29"/>
+          <p:cNvSpPr txBox="1"/>
+          <p:nvPr/>
+        </p:nvSpPr>
+        <p:spPr>
+          <a:xfrm>
+            <a:off x="7986463" y="1336306"/>
+            <a:ext cx="2009461" cy="523220"/>
+          </a:xfrm>
+          <a:prstGeom prst="rect">
+            <a:avLst/>
+          </a:prstGeom>
+          <a:noFill/>
+        </p:spPr>
+        <p:txBody>
+          <a:bodyPr wrap="none" rtlCol="0">
+            <a:spAutoFit/>
+          </a:bodyPr>
+          <a:lstStyle/>
+          <a:p>
+            <a:r>
+              <a:rPr lang="en-US" sz="2800" dirty="0">
+                <a:solidFill>
+                  <a:srgbClr val="FF0000"/>
+                </a:solidFill>
+              </a:rPr>
+              <a:t>You are here</a:t>
+            </a:r>
+          </a:p>
+        </p:txBody>
+      </p:sp>
+    </p:spTree>
+    <p:extLst>
+      <p:ext uri="{BB962C8B-B14F-4D97-AF65-F5344CB8AC3E}">
+        <p14:creationId xmlns:p14="http://schemas.microsoft.com/office/powerpoint/2010/main" val="3955733258"/>
+      </p:ext>
+    </p:extLst>
+  </p:cSld>
+  <p:clrMapOvr>
+    <a:masterClrMapping/>
+  </p:clrMapOvr>
+</p:sld>
+</file>
+
+<file path=ppt/slides/slide37.xml><?xml version="1.0" encoding="utf-8"?>
+<p:sld xmlns:a="http://schemas.openxmlformats.org/drawingml/2006/main" xmlns:r="http://schemas.openxmlformats.org/officeDocument/2006/relationships" xmlns:p="http://schemas.openxmlformats.org/presentationml/2006/main">
+  <p:cSld>
+    <p:spTree>
+      <p:nvGrpSpPr>
+        <p:cNvPr id="1" name=""/>
+        <p:cNvGrpSpPr/>
+        <p:nvPr/>
+      </p:nvGrpSpPr>
+      <p:grpSpPr>
+        <a:xfrm>
+          <a:off x="0" y="0"/>
+          <a:ext cx="0" cy="0"/>
+          <a:chOff x="0" y="0"/>
+          <a:chExt cx="0" cy="0"/>
+        </a:xfrm>
+      </p:grpSpPr>
       <p:sp>
         <p:nvSpPr>
           <p:cNvPr id="14" name="TextBox 13"/>
@@ -14348,7 +14887,7 @@
 </p:sld>
 </file>
 
-<file path=ppt/slides/slide37.xml><?xml version="1.0" encoding="utf-8"?>
+<file path=ppt/slides/slide38.xml><?xml version="1.0" encoding="utf-8"?>
 <p:sld xmlns:a="http://schemas.openxmlformats.org/drawingml/2006/main" xmlns:r="http://schemas.openxmlformats.org/officeDocument/2006/relationships" xmlns:p="http://schemas.openxmlformats.org/presentationml/2006/main">
   <p:cSld>
     <p:spTree>
@@ -14979,104 +15518,6 @@
 </p:sld>
 </file>
 
-<file path=ppt/slides/slide38.xml><?xml version="1.0" encoding="utf-8"?>
-<p:sld xmlns:a="http://schemas.openxmlformats.org/drawingml/2006/main" xmlns:r="http://schemas.openxmlformats.org/officeDocument/2006/relationships" xmlns:p="http://schemas.openxmlformats.org/presentationml/2006/main">
-  <p:cSld>
-    <p:spTree>
-      <p:nvGrpSpPr>
-        <p:cNvPr id="1" name=""/>
-        <p:cNvGrpSpPr/>
-        <p:nvPr/>
-      </p:nvGrpSpPr>
-      <p:grpSpPr>
-        <a:xfrm>
-          <a:off x="0" y="0"/>
-          <a:ext cx="0" cy="0"/>
-          <a:chOff x="0" y="0"/>
-          <a:chExt cx="0" cy="0"/>
-        </a:xfrm>
-      </p:grpSpPr>
-      <p:sp>
-        <p:nvSpPr>
-          <p:cNvPr id="2" name="Title 1"/>
-          <p:cNvSpPr>
-            <a:spLocks noGrp="1"/>
-          </p:cNvSpPr>
-          <p:nvPr>
-            <p:ph type="title"/>
-          </p:nvPr>
-        </p:nvSpPr>
-        <p:spPr/>
-        <p:txBody>
-          <a:bodyPr/>
-          <a:lstStyle/>
-          <a:p>
-            <a:r>
-              <a:rPr lang="en-US" dirty="0"/>
-              <a:t>Things specific to Cassandra</a:t>
-            </a:r>
-          </a:p>
-        </p:txBody>
-      </p:sp>
-      <p:sp>
-        <p:nvSpPr>
-          <p:cNvPr id="3" name="Content Placeholder 2"/>
-          <p:cNvSpPr>
-            <a:spLocks noGrp="1"/>
-          </p:cNvSpPr>
-          <p:nvPr>
-            <p:ph idx="1"/>
-          </p:nvPr>
-        </p:nvSpPr>
-        <p:spPr/>
-        <p:txBody>
-          <a:bodyPr/>
-          <a:lstStyle/>
-          <a:p>
-            <a:r>
-              <a:rPr lang="en-US" dirty="0"/>
-              <a:t>Optimizes on fast and durable writes.</a:t>
-            </a:r>
-          </a:p>
-          <a:p>
-            <a:r>
-              <a:rPr lang="en-US" dirty="0"/>
-              <a:t>Underlying data structure: Bloom Filter</a:t>
-            </a:r>
-          </a:p>
-          <a:p>
-            <a:r>
-              <a:rPr lang="en-US" dirty="0"/>
-              <a:t>There a local mode for Windows (community edition). And its free.</a:t>
-            </a:r>
-          </a:p>
-          <a:p>
-            <a:r>
-              <a:rPr lang="en-US" dirty="0"/>
-              <a:t>Has CQL which is like SQL (not all wide column are this nice!)</a:t>
-            </a:r>
-          </a:p>
-          <a:p>
-            <a:endParaRPr lang="en-US" dirty="0"/>
-          </a:p>
-          <a:p>
-            <a:endParaRPr lang="en-US" dirty="0"/>
-          </a:p>
-        </p:txBody>
-      </p:sp>
-    </p:spTree>
-    <p:extLst>
-      <p:ext uri="{BB962C8B-B14F-4D97-AF65-F5344CB8AC3E}">
-        <p14:creationId xmlns:p14="http://schemas.microsoft.com/office/powerpoint/2010/main" val="2546500980"/>
-      </p:ext>
-    </p:extLst>
-  </p:cSld>
-  <p:clrMapOvr>
-    <a:masterClrMapping/>
-  </p:clrMapOvr>
-</p:sld>
-</file>
-
 <file path=ppt/slides/slide39.xml><?xml version="1.0" encoding="utf-8"?>
 <p:sld xmlns:a="http://schemas.openxmlformats.org/drawingml/2006/main" xmlns:r="http://schemas.openxmlformats.org/officeDocument/2006/relationships" xmlns:p="http://schemas.openxmlformats.org/presentationml/2006/main">
   <p:cSld>
@@ -15096,7 +15537,7 @@
       </p:grpSpPr>
       <p:sp>
         <p:nvSpPr>
-          <p:cNvPr id="6" name="Title 1"/>
+          <p:cNvPr id="2" name="Title 1"/>
           <p:cNvSpPr>
             <a:spLocks noGrp="1"/>
           </p:cNvSpPr>
@@ -15104,127 +15545,68 @@
             <p:ph type="title"/>
           </p:nvPr>
         </p:nvSpPr>
-        <p:spPr>
-          <a:xfrm>
-            <a:off x="2667000" y="457200"/>
-            <a:ext cx="6781800" cy="1066800"/>
-          </a:xfrm>
-        </p:spPr>
-        <p:txBody>
-          <a:bodyPr>
-            <a:normAutofit/>
-          </a:bodyPr>
-          <a:lstStyle/>
-          <a:p>
-            <a:pPr algn="ctr"/>
+        <p:spPr/>
+        <p:txBody>
+          <a:bodyPr/>
+          <a:lstStyle/>
+          <a:p>
             <a:r>
               <a:rPr lang="en-US" dirty="0"/>
-              <a:t>Cassandra Overview</a:t>
-            </a:r>
-          </a:p>
-        </p:txBody>
-      </p:sp>
-      <p:sp>
-        <p:nvSpPr>
-          <p:cNvPr id="2" name="TextBox 1"/>
-          <p:cNvSpPr txBox="1"/>
-          <p:nvPr/>
-        </p:nvSpPr>
-        <p:spPr>
-          <a:xfrm>
-            <a:off x="2362200" y="2057401"/>
-            <a:ext cx="7086600" cy="3970318"/>
-          </a:xfrm>
-          <a:prstGeom prst="rect">
-            <a:avLst/>
-          </a:prstGeom>
-          <a:noFill/>
-        </p:spPr>
-        <p:txBody>
-          <a:bodyPr wrap="square" rtlCol="0">
-            <a:spAutoFit/>
-          </a:bodyPr>
-          <a:lstStyle/>
-          <a:p>
-            <a:pPr marL="342900" indent="-342900">
-              <a:lnSpc>
-                <a:spcPct val="150000"/>
-              </a:lnSpc>
-              <a:buFont typeface="Arial" panose="020B0604020202020204" pitchFamily="34" charset="0"/>
-              <a:buChar char="•"/>
-            </a:pPr>
-            <a:r>
-              <a:rPr lang="en-US" sz="2400" b="1" dirty="0"/>
-              <a:t>Open source distributed database management system </a:t>
-            </a:r>
-            <a:r>
-              <a:rPr lang="en-US" sz="2400" dirty="0"/>
-              <a:t>for handling huge amounts of data across many commodity systems</a:t>
-            </a:r>
-          </a:p>
-          <a:p>
-            <a:pPr marL="342900" indent="-342900">
-              <a:lnSpc>
-                <a:spcPct val="150000"/>
-              </a:lnSpc>
-              <a:buFont typeface="Arial" panose="020B0604020202020204" pitchFamily="34" charset="0"/>
-              <a:buChar char="•"/>
-            </a:pPr>
-            <a:r>
-              <a:rPr lang="en-US" sz="2400" b="1" dirty="0"/>
-              <a:t>Cassandra </a:t>
-            </a:r>
-            <a:r>
-              <a:rPr lang="en-US" sz="2400" dirty="0"/>
-              <a:t>is a “</a:t>
-            </a:r>
-            <a:r>
-              <a:rPr lang="en-US" sz="2400" b="1" dirty="0"/>
-              <a:t>NoSQL” or “Non-Relational” </a:t>
-            </a:r>
-            <a:r>
-              <a:rPr lang="en-US" sz="2400" dirty="0"/>
-              <a:t>database</a:t>
-            </a:r>
-            <a:r>
-              <a:rPr lang="en-US" sz="2400" b="1" dirty="0"/>
-              <a:t> </a:t>
-            </a:r>
-            <a:r>
-              <a:rPr lang="en-US" sz="2400" dirty="0"/>
-              <a:t>and </a:t>
-            </a:r>
-            <a:r>
-              <a:rPr lang="en-US" sz="2400" b="1" dirty="0"/>
-              <a:t> </a:t>
-            </a:r>
-            <a:r>
-              <a:rPr lang="en-US" sz="2400" dirty="0"/>
-              <a:t>can be described as a mix between a </a:t>
-            </a:r>
-            <a:r>
-              <a:rPr lang="en-US" sz="2400" b="1" dirty="0"/>
-              <a:t>“Key-value Store”</a:t>
-            </a:r>
-            <a:r>
-              <a:rPr lang="en-US" sz="2400" dirty="0"/>
-              <a:t> and a </a:t>
-            </a:r>
-            <a:r>
-              <a:rPr lang="en-US" sz="2400" b="1" dirty="0"/>
-              <a:t>“Column-Orientated” </a:t>
-            </a:r>
-            <a:r>
-              <a:rPr lang="en-US" sz="2400" dirty="0"/>
-              <a:t>database</a:t>
-            </a:r>
+              <a:t>Things specific to Cassandra</a:t>
+            </a:r>
+          </a:p>
+        </p:txBody>
+      </p:sp>
+      <p:sp>
+        <p:nvSpPr>
+          <p:cNvPr id="3" name="Content Placeholder 2"/>
+          <p:cNvSpPr>
+            <a:spLocks noGrp="1"/>
+          </p:cNvSpPr>
+          <p:nvPr>
+            <p:ph idx="1"/>
+          </p:nvPr>
+        </p:nvSpPr>
+        <p:spPr/>
+        <p:txBody>
+          <a:bodyPr/>
+          <a:lstStyle/>
+          <a:p>
+            <a:r>
+              <a:rPr lang="en-US" dirty="0"/>
+              <a:t>Optimizes on fast and durable writes.</a:t>
+            </a:r>
+          </a:p>
+          <a:p>
+            <a:r>
+              <a:rPr lang="en-US" dirty="0"/>
+              <a:t>Underlying data structure: Bloom Filter</a:t>
+            </a:r>
+          </a:p>
+          <a:p>
+            <a:r>
+              <a:rPr lang="en-US" dirty="0"/>
+              <a:t>There a local mode for Windows (community edition). And its free.</a:t>
+            </a:r>
+          </a:p>
+          <a:p>
+            <a:r>
+              <a:rPr lang="en-US" dirty="0"/>
+              <a:t>Has CQL which is like SQL (not all wide column are this nice!)</a:t>
+            </a:r>
+          </a:p>
+          <a:p>
+            <a:endParaRPr lang="en-US" dirty="0"/>
+          </a:p>
+          <a:p>
+            <a:endParaRPr lang="en-US" dirty="0"/>
           </a:p>
         </p:txBody>
       </p:sp>
     </p:spTree>
     <p:extLst>
       <p:ext uri="{BB962C8B-B14F-4D97-AF65-F5344CB8AC3E}">
-        <p14:creationId xmlns:p14="http://schemas.microsoft.com/office/powerpoint/2010/main" val="3537640460"/>
+        <p14:creationId xmlns:p14="http://schemas.microsoft.com/office/powerpoint/2010/main" val="2546500980"/>
       </p:ext>
     </p:extLst>
   </p:cSld>
@@ -15765,20 +16147,20 @@
         </p:nvSpPr>
         <p:spPr>
           <a:xfrm>
-            <a:off x="2362200" y="457200"/>
-            <a:ext cx="7620000" cy="1066800"/>
+            <a:off x="2667000" y="457200"/>
+            <a:ext cx="6781800" cy="1066800"/>
           </a:xfrm>
         </p:spPr>
         <p:txBody>
           <a:bodyPr>
-            <a:normAutofit fontScale="90000"/>
+            <a:normAutofit/>
           </a:bodyPr>
           <a:lstStyle/>
           <a:p>
             <a:pPr algn="ctr"/>
             <a:r>
               <a:rPr lang="en-US" dirty="0"/>
-              <a:t>Where Did Cassandra Come From?</a:t>
+              <a:t>Cassandra Overview</a:t>
             </a:r>
           </a:p>
         </p:txBody>
@@ -15792,7 +16174,7 @@
         <p:spPr>
           <a:xfrm>
             <a:off x="2362200" y="2057401"/>
-            <a:ext cx="7086600" cy="3139321"/>
+            <a:ext cx="7086600" cy="3970318"/>
           </a:xfrm>
           <a:prstGeom prst="rect">
             <a:avLst/>
@@ -15813,8 +16195,12 @@
               <a:buChar char="•"/>
             </a:pPr>
             <a:r>
-              <a:rPr lang="en-US" sz="2200" dirty="0"/>
-              <a:t>Cassandra was initially created at Facebook</a:t>
+              <a:rPr lang="en-US" sz="2400" b="1" dirty="0"/>
+              <a:t>Open source distributed database management system </a:t>
+            </a:r>
+            <a:r>
+              <a:rPr lang="en-US" sz="2400" dirty="0"/>
+              <a:t>for handling huge amounts of data across many commodity systems</a:t>
             </a:r>
           </a:p>
           <a:p>
@@ -15826,75 +16212,52 @@
               <a:buChar char="•"/>
             </a:pPr>
             <a:r>
-              <a:rPr lang="en-US" sz="2200" dirty="0"/>
-              <a:t>Combination of Google Big Table and Amazon Dynamo</a:t>
-            </a:r>
-          </a:p>
-          <a:p>
-            <a:pPr marL="342900" indent="-342900">
-              <a:lnSpc>
-                <a:spcPct val="150000"/>
-              </a:lnSpc>
-              <a:buFont typeface="Arial" panose="020B0604020202020204" pitchFamily="34" charset="0"/>
-              <a:buChar char="•"/>
-            </a:pPr>
-            <a:r>
-              <a:rPr lang="en-US" sz="2200" dirty="0"/>
-              <a:t>It was created to power the </a:t>
-            </a:r>
-            <a:r>
-              <a:rPr lang="en-US" sz="2200" b="1" dirty="0"/>
-              <a:t>“Inbox Search” </a:t>
-            </a:r>
-            <a:r>
-              <a:rPr lang="en-US" sz="2200" dirty="0"/>
-              <a:t>feature</a:t>
-            </a:r>
-          </a:p>
-          <a:p>
-            <a:pPr marL="342900" indent="-342900">
-              <a:lnSpc>
-                <a:spcPct val="150000"/>
-              </a:lnSpc>
-              <a:buFont typeface="Arial" panose="020B0604020202020204" pitchFamily="34" charset="0"/>
-              <a:buChar char="•"/>
-            </a:pPr>
-            <a:r>
-              <a:rPr lang="en-US" sz="2200" dirty="0"/>
-              <a:t>Cassandra was released as open source in </a:t>
-            </a:r>
-            <a:r>
-              <a:rPr lang="en-US" sz="2200" b="1" dirty="0"/>
-              <a:t>July of 2008</a:t>
-            </a:r>
-          </a:p>
-          <a:p>
-            <a:pPr marL="342900" indent="-342900">
-              <a:lnSpc>
-                <a:spcPct val="150000"/>
-              </a:lnSpc>
-              <a:buFont typeface="Arial" panose="020B0604020202020204" pitchFamily="34" charset="0"/>
-              <a:buChar char="•"/>
-            </a:pPr>
-            <a:r>
-              <a:rPr lang="en-US" sz="2200" dirty="0"/>
-              <a:t>It became an </a:t>
-            </a:r>
-            <a:r>
-              <a:rPr lang="en-US" sz="2200" b="1" dirty="0"/>
-              <a:t>Apache Incubator </a:t>
-            </a:r>
-            <a:r>
-              <a:rPr lang="en-US" sz="2200" dirty="0"/>
-              <a:t>project in </a:t>
-            </a:r>
-            <a:r>
-              <a:rPr lang="en-US" sz="2200" b="1" dirty="0"/>
-              <a:t>February of 2009</a:t>
-            </a:r>
-            <a:r>
-              <a:rPr lang="en-US" sz="2200" dirty="0"/>
-              <a:t> and It became a full level project a year after that</a:t>
+              <a:rPr lang="en-US" sz="2400" b="1" dirty="0"/>
+              <a:t>Cassandra </a:t>
+            </a:r>
+            <a:r>
+              <a:rPr lang="en-US" sz="2400" dirty="0"/>
+              <a:t>is a “</a:t>
+            </a:r>
+            <a:r>
+              <a:rPr lang="en-US" sz="2400" b="1" dirty="0"/>
+              <a:t>NoSQL” or “Non-Relational” </a:t>
+            </a:r>
+            <a:r>
+              <a:rPr lang="en-US" sz="2400" dirty="0"/>
+              <a:t>database</a:t>
+            </a:r>
+            <a:r>
+              <a:rPr lang="en-US" sz="2400" b="1" dirty="0"/>
+              <a:t> </a:t>
+            </a:r>
+            <a:r>
+              <a:rPr lang="en-US" sz="2400" dirty="0"/>
+              <a:t>and </a:t>
+            </a:r>
+            <a:r>
+              <a:rPr lang="en-US" sz="2400" b="1" dirty="0"/>
+              <a:t> </a:t>
+            </a:r>
+            <a:r>
+              <a:rPr lang="en-US" sz="2400" dirty="0"/>
+              <a:t>can be described as a mix between a </a:t>
+            </a:r>
+            <a:r>
+              <a:rPr lang="en-US" sz="2400" b="1" dirty="0"/>
+              <a:t>“Key-value Store”</a:t>
+            </a:r>
+            <a:r>
+              <a:rPr lang="en-US" sz="2400" dirty="0"/>
+              <a:t> and a </a:t>
+            </a:r>
+            <a:r>
+              <a:rPr lang="en-US" sz="2400" b="1" dirty="0"/>
+              <a:t>“Column-Orientated” </a:t>
+            </a:r>
+            <a:r>
+              <a:rPr lang="en-US" sz="2400" dirty="0"/>
+              <a:t>database</a:t>
             </a:r>
           </a:p>
         </p:txBody>
@@ -15902,7 +16265,7 @@
     </p:spTree>
     <p:extLst>
       <p:ext uri="{BB962C8B-B14F-4D97-AF65-F5344CB8AC3E}">
-        <p14:creationId xmlns:p14="http://schemas.microsoft.com/office/powerpoint/2010/main" val="3686043113"/>
+        <p14:creationId xmlns:p14="http://schemas.microsoft.com/office/powerpoint/2010/main" val="3537640460"/>
       </p:ext>
     </p:extLst>
   </p:cSld>
@@ -15947,14 +16310,14 @@
         </p:spPr>
         <p:txBody>
           <a:bodyPr>
-            <a:normAutofit/>
+            <a:normAutofit fontScale="90000"/>
           </a:bodyPr>
           <a:lstStyle/>
           <a:p>
             <a:pPr algn="ctr"/>
             <a:r>
               <a:rPr lang="en-US" dirty="0"/>
-              <a:t>Cassandra Architecture</a:t>
+              <a:t>Where Did Cassandra Come From?</a:t>
             </a:r>
           </a:p>
         </p:txBody>
@@ -15967,8 +16330,8 @@
         </p:nvSpPr>
         <p:spPr>
           <a:xfrm>
-            <a:off x="2362200" y="1905000"/>
-            <a:ext cx="7086600" cy="4154984"/>
+            <a:off x="2362200" y="2057401"/>
+            <a:ext cx="7086600" cy="3139321"/>
           </a:xfrm>
           <a:prstGeom prst="rect">
             <a:avLst/>
@@ -15990,7 +16353,7 @@
             </a:pPr>
             <a:r>
               <a:rPr lang="en-US" sz="2200" dirty="0"/>
-              <a:t>Built with the understanding that hardware &amp; software failures can happen</a:t>
+              <a:t>Cassandra was initially created at Facebook</a:t>
             </a:r>
           </a:p>
           <a:p>
@@ -16003,7 +16366,7 @@
             </a:pPr>
             <a:r>
               <a:rPr lang="en-US" sz="2200" dirty="0"/>
-              <a:t>Peer to Peer Architecture</a:t>
+              <a:t>Combination of Google Big Table and Amazon Dynamo</a:t>
             </a:r>
           </a:p>
           <a:p>
@@ -16016,7 +16379,15 @@
             </a:pPr>
             <a:r>
               <a:rPr lang="en-US" sz="2200" dirty="0"/>
-              <a:t>All nodes are the same</a:t>
+              <a:t>It was created to power the </a:t>
+            </a:r>
+            <a:r>
+              <a:rPr lang="en-US" sz="2200" b="1" dirty="0"/>
+              <a:t>“Inbox Search” </a:t>
+            </a:r>
+            <a:r>
+              <a:rPr lang="en-US" sz="2200" dirty="0"/>
+              <a:t>feature</a:t>
             </a:r>
           </a:p>
           <a:p>
@@ -16029,7 +16400,11 @@
             </a:pPr>
             <a:r>
               <a:rPr lang="en-US" sz="2200" dirty="0"/>
-              <a:t>Read/Write Anywhere</a:t>
+              <a:t>Cassandra was released as open source in </a:t>
+            </a:r>
+            <a:r>
+              <a:rPr lang="en-US" sz="2200" b="1" dirty="0"/>
+              <a:t>July of 2008</a:t>
             </a:r>
           </a:p>
           <a:p>
@@ -16042,71 +16417,31 @@
             </a:pPr>
             <a:r>
               <a:rPr lang="en-US" sz="2200" dirty="0"/>
-              <a:t>Gossip Protocol</a:t>
-            </a:r>
-          </a:p>
-          <a:p>
-            <a:pPr marL="342900" indent="-342900">
-              <a:lnSpc>
-                <a:spcPct val="150000"/>
-              </a:lnSpc>
-              <a:buFont typeface="Arial" panose="020B0604020202020204" pitchFamily="34" charset="0"/>
-              <a:buChar char="•"/>
-            </a:pPr>
+              <a:t>It became an </a:t>
+            </a:r>
+            <a:r>
+              <a:rPr lang="en-US" sz="2200" b="1" dirty="0"/>
+              <a:t>Apache Incubator </a:t>
+            </a:r>
             <a:r>
               <a:rPr lang="en-US" sz="2200" dirty="0"/>
-              <a:t>Commit Log Captures All Activity</a:t>
-            </a:r>
-          </a:p>
-          <a:p>
-            <a:pPr marL="342900" indent="-342900">
-              <a:lnSpc>
-                <a:spcPct val="150000"/>
-              </a:lnSpc>
-              <a:buFont typeface="Arial" panose="020B0604020202020204" pitchFamily="34" charset="0"/>
-              <a:buChar char="•"/>
-            </a:pPr>
+              <a:t>project in </a:t>
+            </a:r>
+            <a:r>
+              <a:rPr lang="en-US" sz="2200" b="1" dirty="0"/>
+              <a:t>February of 2009</a:t>
+            </a:r>
             <a:r>
               <a:rPr lang="en-US" sz="2200" dirty="0"/>
-              <a:t>Well suited for cloud deployments</a:t>
-            </a:r>
-          </a:p>
-        </p:txBody>
-      </p:sp>
-      <p:pic>
-        <p:nvPicPr>
-          <p:cNvPr id="3" name="Picture 2"/>
-          <p:cNvPicPr>
-            <a:picLocks noChangeAspect="1"/>
-          </p:cNvPicPr>
-          <p:nvPr/>
-        </p:nvPicPr>
-        <p:blipFill>
-          <a:blip r:embed="rId2">
-            <a:extLst>
-              <a:ext uri="{28A0092B-C50C-407E-A947-70E740481C1C}">
-                <a14:useLocalDpi xmlns:a14="http://schemas.microsoft.com/office/drawing/2010/main" val="0"/>
-              </a:ext>
-            </a:extLst>
-          </a:blip>
-          <a:stretch>
-            <a:fillRect/>
-          </a:stretch>
-        </p:blipFill>
-        <p:spPr>
-          <a:xfrm>
-            <a:off x="6400801" y="2955510"/>
-            <a:ext cx="3840979" cy="2749043"/>
-          </a:xfrm>
-          <a:prstGeom prst="rect">
-            <a:avLst/>
-          </a:prstGeom>
-        </p:spPr>
-      </p:pic>
+              <a:t> and It became a full level project a year after that</a:t>
+            </a:r>
+          </a:p>
+        </p:txBody>
+      </p:sp>
     </p:spTree>
     <p:extLst>
       <p:ext uri="{BB962C8B-B14F-4D97-AF65-F5344CB8AC3E}">
-        <p14:creationId xmlns:p14="http://schemas.microsoft.com/office/powerpoint/2010/main" val="2834481071"/>
+        <p14:creationId xmlns:p14="http://schemas.microsoft.com/office/powerpoint/2010/main" val="3686043113"/>
       </p:ext>
     </p:extLst>
   </p:cSld>
@@ -16158,7 +16493,7 @@
             <a:pPr algn="ctr"/>
             <a:r>
               <a:rPr lang="en-US" dirty="0"/>
-              <a:t>Features of Cassandra</a:t>
+              <a:t>Cassandra Architecture</a:t>
             </a:r>
           </a:p>
         </p:txBody>
@@ -16171,8 +16506,8 @@
         </p:nvSpPr>
         <p:spPr>
           <a:xfrm>
-            <a:off x="2362200" y="2057400"/>
-            <a:ext cx="7086600" cy="3785652"/>
+            <a:off x="2362200" y="1905000"/>
+            <a:ext cx="7086600" cy="4154984"/>
           </a:xfrm>
           <a:prstGeom prst="rect">
             <a:avLst/>
@@ -16193,12 +16528,8 @@
               <a:buChar char="•"/>
             </a:pPr>
             <a:r>
-              <a:rPr lang="en-US" sz="2000" b="1" dirty="0"/>
-              <a:t>Decentralized</a:t>
-            </a:r>
-            <a:r>
-              <a:rPr lang="en-US" sz="2000" dirty="0"/>
-              <a:t> – No master &amp; no single point of failure. Data is distributed across the cluster</a:t>
+              <a:rPr lang="en-US" sz="2200" dirty="0"/>
+              <a:t>Built with the understanding that hardware &amp; software failures can happen</a:t>
             </a:r>
           </a:p>
           <a:p>
@@ -16210,12 +16541,8 @@
               <a:buChar char="•"/>
             </a:pPr>
             <a:r>
-              <a:rPr lang="en-US" sz="2000" b="1" dirty="0"/>
-              <a:t>Replication</a:t>
-            </a:r>
-            <a:r>
-              <a:rPr lang="en-US" sz="2000" dirty="0"/>
-              <a:t> – Tailored for multiple-data center deployment</a:t>
+              <a:rPr lang="en-US" sz="2200" dirty="0"/>
+              <a:t>Peer to Peer Architecture</a:t>
             </a:r>
           </a:p>
           <a:p>
@@ -16227,12 +16554,8 @@
               <a:buChar char="•"/>
             </a:pPr>
             <a:r>
-              <a:rPr lang="en-US" sz="2000" b="1" dirty="0"/>
-              <a:t>Scalability </a:t>
-            </a:r>
-            <a:r>
-              <a:rPr lang="en-US" sz="2000" dirty="0"/>
-              <a:t>– New machines can easily be added with no downtime or interruption</a:t>
+              <a:rPr lang="en-US" sz="2200" dirty="0"/>
+              <a:t>All nodes are the same</a:t>
             </a:r>
           </a:p>
           <a:p>
@@ -16244,16 +16567,8 @@
               <a:buChar char="•"/>
             </a:pPr>
             <a:r>
-              <a:rPr lang="en-US" sz="2000" dirty="0"/>
-              <a:t> </a:t>
-            </a:r>
-            <a:r>
-              <a:rPr lang="en-US" sz="2000" b="1" dirty="0"/>
-              <a:t>Fault Tolerance </a:t>
-            </a:r>
-            <a:r>
-              <a:rPr lang="en-US" sz="2000" dirty="0"/>
-              <a:t>– Failed nodes can be replaced with no downtime</a:t>
+              <a:rPr lang="en-US" sz="2200" dirty="0"/>
+              <a:t>Read/Write Anywhere</a:t>
             </a:r>
           </a:p>
           <a:p>
@@ -16265,20 +16580,72 @@
               <a:buChar char="•"/>
             </a:pPr>
             <a:r>
-              <a:rPr lang="en-US" sz="2000" b="1" dirty="0"/>
-              <a:t>Cassandra Query Language (CQL) </a:t>
-            </a:r>
-            <a:r>
-              <a:rPr lang="en-US" sz="2000" dirty="0"/>
-              <a:t>– An SQL-like alternative</a:t>
-            </a:r>
-          </a:p>
-        </p:txBody>
-      </p:sp>
+              <a:rPr lang="en-US" sz="2200" dirty="0"/>
+              <a:t>Gossip Protocol</a:t>
+            </a:r>
+          </a:p>
+          <a:p>
+            <a:pPr marL="342900" indent="-342900">
+              <a:lnSpc>
+                <a:spcPct val="150000"/>
+              </a:lnSpc>
+              <a:buFont typeface="Arial" panose="020B0604020202020204" pitchFamily="34" charset="0"/>
+              <a:buChar char="•"/>
+            </a:pPr>
+            <a:r>
+              <a:rPr lang="en-US" sz="2200" dirty="0"/>
+              <a:t>Commit Log Captures All Activity</a:t>
+            </a:r>
+          </a:p>
+          <a:p>
+            <a:pPr marL="342900" indent="-342900">
+              <a:lnSpc>
+                <a:spcPct val="150000"/>
+              </a:lnSpc>
+              <a:buFont typeface="Arial" panose="020B0604020202020204" pitchFamily="34" charset="0"/>
+              <a:buChar char="•"/>
+            </a:pPr>
+            <a:r>
+              <a:rPr lang="en-US" sz="2200" dirty="0"/>
+              <a:t>Well suited for cloud deployments</a:t>
+            </a:r>
+          </a:p>
+        </p:txBody>
+      </p:sp>
+      <p:pic>
+        <p:nvPicPr>
+          <p:cNvPr id="3" name="Picture 2"/>
+          <p:cNvPicPr>
+            <a:picLocks noChangeAspect="1"/>
+          </p:cNvPicPr>
+          <p:nvPr/>
+        </p:nvPicPr>
+        <p:blipFill>
+          <a:blip r:embed="rId2">
+            <a:extLst>
+              <a:ext uri="{28A0092B-C50C-407E-A947-70E740481C1C}">
+                <a14:useLocalDpi xmlns:a14="http://schemas.microsoft.com/office/drawing/2010/main" val="0"/>
+              </a:ext>
+            </a:extLst>
+          </a:blip>
+          <a:stretch>
+            <a:fillRect/>
+          </a:stretch>
+        </p:blipFill>
+        <p:spPr>
+          <a:xfrm>
+            <a:off x="6400801" y="2955510"/>
+            <a:ext cx="3840979" cy="2749043"/>
+          </a:xfrm>
+          <a:prstGeom prst="rect">
+            <a:avLst/>
+          </a:prstGeom>
+        </p:spPr>
+      </p:pic>
     </p:spTree>
     <p:extLst>
       <p:ext uri="{BB962C8B-B14F-4D97-AF65-F5344CB8AC3E}">
-        <p14:creationId xmlns:p14="http://schemas.microsoft.com/office/powerpoint/2010/main" val="3008326492"/>
+        <p14:creationId xmlns:p14="http://schemas.microsoft.com/office/powerpoint/2010/main" val="2834481071"/>
       </p:ext>
     </p:extLst>
   </p:cSld>
@@ -16330,7 +16697,7 @@
             <a:pPr algn="ctr"/>
             <a:r>
               <a:rPr lang="en-US" dirty="0"/>
-              <a:t>CQL (Cassandra Query Language)</a:t>
+              <a:t>Features of Cassandra</a:t>
             </a:r>
           </a:p>
         </p:txBody>
@@ -16344,7 +16711,7 @@
         <p:spPr>
           <a:xfrm>
             <a:off x="2362200" y="2057400"/>
-            <a:ext cx="7086600" cy="3970318"/>
+            <a:ext cx="7086600" cy="3785652"/>
           </a:xfrm>
           <a:prstGeom prst="rect">
             <a:avLst/>
@@ -16365,20 +16732,12 @@
               <a:buChar char="•"/>
             </a:pPr>
             <a:r>
-              <a:rPr lang="en-US" sz="2400" b="1" dirty="0"/>
-              <a:t>CQL</a:t>
-            </a:r>
-            <a:r>
-              <a:rPr lang="en-US" sz="2400" dirty="0"/>
-              <a:t> is very similar to </a:t>
-            </a:r>
-            <a:r>
-              <a:rPr lang="en-US" sz="2400" b="1" dirty="0"/>
-              <a:t>SQL </a:t>
-            </a:r>
-            <a:r>
-              <a:rPr lang="en-US" sz="2400" dirty="0"/>
-              <a:t>(Structured Query Language) in terms of syntax and commands</a:t>
+              <a:rPr lang="en-US" sz="2000" b="1" dirty="0"/>
+              <a:t>Decentralized</a:t>
+            </a:r>
+            <a:r>
+              <a:rPr lang="en-US" sz="2000" dirty="0"/>
+              <a:t> – No master &amp; no single point of failure. Data is distributed across the cluster</a:t>
             </a:r>
           </a:p>
           <a:p>
@@ -16390,8 +16749,12 @@
               <a:buChar char="•"/>
             </a:pPr>
             <a:r>
-              <a:rPr lang="en-US" sz="2400" dirty="0"/>
-              <a:t>Statements directly change data and/or change the way data is stored</a:t>
+              <a:rPr lang="en-US" sz="2000" b="1" dirty="0"/>
+              <a:t>Replication</a:t>
+            </a:r>
+            <a:r>
+              <a:rPr lang="en-US" sz="2000" dirty="0"/>
+              <a:t> – Tailored for multiple-data center deployment</a:t>
             </a:r>
           </a:p>
           <a:p>
@@ -16403,31 +16766,50 @@
               <a:buChar char="•"/>
             </a:pPr>
             <a:r>
-              <a:rPr lang="en-US" sz="2400" dirty="0"/>
-              <a:t>All statements end with a semi-colon</a:t>
-            </a:r>
-          </a:p>
-          <a:p>
-            <a:pPr>
+              <a:rPr lang="en-US" sz="2000" b="1" dirty="0"/>
+              <a:t>Scalability </a:t>
+            </a:r>
+            <a:r>
+              <a:rPr lang="en-US" sz="2000" dirty="0"/>
+              <a:t>– New machines can easily be added with no downtime or interruption</a:t>
+            </a:r>
+          </a:p>
+          <a:p>
+            <a:pPr marL="342900" indent="-342900">
               <a:lnSpc>
                 <a:spcPct val="150000"/>
               </a:lnSpc>
+              <a:buFont typeface="Arial" panose="020B0604020202020204" pitchFamily="34" charset="0"/>
+              <a:buChar char="•"/>
             </a:pPr>
-            <a:endParaRPr lang="en-US" sz="2400" dirty="0"/>
-          </a:p>
-          <a:p>
-            <a:pPr>
+            <a:r>
+              <a:rPr lang="en-US" sz="2000" dirty="0"/>
+              <a:t> </a:t>
+            </a:r>
+            <a:r>
+              <a:rPr lang="en-US" sz="2000" b="1" dirty="0"/>
+              <a:t>Fault Tolerance </a:t>
+            </a:r>
+            <a:r>
+              <a:rPr lang="en-US" sz="2000" dirty="0"/>
+              <a:t>– Failed nodes can be replaced with no downtime</a:t>
+            </a:r>
+          </a:p>
+          <a:p>
+            <a:pPr marL="342900" indent="-342900">
               <a:lnSpc>
                 <a:spcPct val="150000"/>
               </a:lnSpc>
+              <a:buFont typeface="Arial" panose="020B0604020202020204" pitchFamily="34" charset="0"/>
+              <a:buChar char="•"/>
             </a:pPr>
             <a:r>
-              <a:rPr lang="en-US" sz="2400" dirty="0">
-                <a:solidFill>
-                  <a:schemeClr val="tx2"/>
-                </a:solidFill>
-              </a:rPr>
-              <a:t>SELECT * FROM sampletable;</a:t>
+              <a:rPr lang="en-US" sz="2000" b="1" dirty="0"/>
+              <a:t>Cassandra Query Language (CQL) </a:t>
+            </a:r>
+            <a:r>
+              <a:rPr lang="en-US" sz="2000" dirty="0"/>
+              <a:t>– An SQL-like alternative</a:t>
             </a:r>
           </a:p>
         </p:txBody>
@@ -16435,7 +16817,7 @@
     </p:spTree>
     <p:extLst>
       <p:ext uri="{BB962C8B-B14F-4D97-AF65-F5344CB8AC3E}">
-        <p14:creationId xmlns:p14="http://schemas.microsoft.com/office/powerpoint/2010/main" val="3971468642"/>
+        <p14:creationId xmlns:p14="http://schemas.microsoft.com/office/powerpoint/2010/main" val="3008326492"/>
       </p:ext>
     </p:extLst>
   </p:cSld>
@@ -16464,7 +16846,7 @@
       </p:grpSpPr>
       <p:sp>
         <p:nvSpPr>
-          <p:cNvPr id="2" name="Title 1"/>
+          <p:cNvPr id="6" name="Title 1"/>
           <p:cNvSpPr>
             <a:spLocks noGrp="1"/>
           </p:cNvSpPr>
@@ -16474,219 +16856,125 @@
         </p:nvSpPr>
         <p:spPr>
           <a:xfrm>
-            <a:off x="751572" y="176572"/>
-            <a:ext cx="3493168" cy="1007632"/>
-          </a:xfrm>
-        </p:spPr>
-        <p:txBody>
-          <a:bodyPr/>
-          <a:lstStyle/>
-          <a:p>
-            <a:r>
-              <a:rPr lang="en-US" b="1" dirty="0">
+            <a:off x="2362200" y="457200"/>
+            <a:ext cx="7620000" cy="1066800"/>
+          </a:xfrm>
+        </p:spPr>
+        <p:txBody>
+          <a:bodyPr>
+            <a:normAutofit/>
+          </a:bodyPr>
+          <a:lstStyle/>
+          <a:p>
+            <a:pPr algn="ctr"/>
+            <a:r>
+              <a:rPr lang="en-US" dirty="0"/>
+              <a:t>CQL (Cassandra Query Language)</a:t>
+            </a:r>
+          </a:p>
+        </p:txBody>
+      </p:sp>
+      <p:sp>
+        <p:nvSpPr>
+          <p:cNvPr id="2" name="TextBox 1"/>
+          <p:cNvSpPr txBox="1"/>
+          <p:nvPr/>
+        </p:nvSpPr>
+        <p:spPr>
+          <a:xfrm>
+            <a:off x="2362200" y="2057400"/>
+            <a:ext cx="7086600" cy="3970318"/>
+          </a:xfrm>
+          <a:prstGeom prst="rect">
+            <a:avLst/>
+          </a:prstGeom>
+          <a:noFill/>
+        </p:spPr>
+        <p:txBody>
+          <a:bodyPr wrap="square" rtlCol="0">
+            <a:spAutoFit/>
+          </a:bodyPr>
+          <a:lstStyle/>
+          <a:p>
+            <a:pPr marL="342900" indent="-342900">
+              <a:lnSpc>
+                <a:spcPct val="150000"/>
+              </a:lnSpc>
+              <a:buFont typeface="Arial" panose="020B0604020202020204" pitchFamily="34" charset="0"/>
+              <a:buChar char="•"/>
+            </a:pPr>
+            <a:r>
+              <a:rPr lang="en-US" sz="2400" b="1" dirty="0"/>
+              <a:t>CQL</a:t>
+            </a:r>
+            <a:r>
+              <a:rPr lang="en-US" sz="2400" dirty="0"/>
+              <a:t> is very similar to </a:t>
+            </a:r>
+            <a:r>
+              <a:rPr lang="en-US" sz="2400" b="1" dirty="0"/>
+              <a:t>SQL </a:t>
+            </a:r>
+            <a:r>
+              <a:rPr lang="en-US" sz="2400" dirty="0"/>
+              <a:t>(Structured Query Language) in terms of syntax and commands</a:t>
+            </a:r>
+          </a:p>
+          <a:p>
+            <a:pPr marL="342900" indent="-342900">
+              <a:lnSpc>
+                <a:spcPct val="150000"/>
+              </a:lnSpc>
+              <a:buFont typeface="Arial" panose="020B0604020202020204" pitchFamily="34" charset="0"/>
+              <a:buChar char="•"/>
+            </a:pPr>
+            <a:r>
+              <a:rPr lang="en-US" sz="2400" dirty="0"/>
+              <a:t>Statements directly change data and/or change the way data is stored</a:t>
+            </a:r>
+          </a:p>
+          <a:p>
+            <a:pPr marL="342900" indent="-342900">
+              <a:lnSpc>
+                <a:spcPct val="150000"/>
+              </a:lnSpc>
+              <a:buFont typeface="Arial" panose="020B0604020202020204" pitchFamily="34" charset="0"/>
+              <a:buChar char="•"/>
+            </a:pPr>
+            <a:r>
+              <a:rPr lang="en-US" sz="2400" dirty="0"/>
+              <a:t>All statements end with a semi-colon</a:t>
+            </a:r>
+          </a:p>
+          <a:p>
+            <a:pPr>
+              <a:lnSpc>
+                <a:spcPct val="150000"/>
+              </a:lnSpc>
+            </a:pPr>
+            <a:endParaRPr lang="en-US" sz="2400" dirty="0"/>
+          </a:p>
+          <a:p>
+            <a:pPr>
+              <a:lnSpc>
+                <a:spcPct val="150000"/>
+              </a:lnSpc>
+            </a:pPr>
+            <a:r>
+              <a:rPr lang="en-US" sz="2400" dirty="0">
                 <a:solidFill>
-                  <a:srgbClr val="FFFF00"/>
+                  <a:schemeClr val="tx2"/>
                 </a:solidFill>
               </a:rPr>
-              <a:t>The Checklist</a:t>
-            </a:r>
-          </a:p>
-        </p:txBody>
-      </p:sp>
-      <p:sp>
-        <p:nvSpPr>
-          <p:cNvPr id="3" name="Content Placeholder 2"/>
-          <p:cNvSpPr>
-            <a:spLocks noGrp="1"/>
-          </p:cNvSpPr>
-          <p:nvPr>
-            <p:ph idx="1"/>
-          </p:nvPr>
-        </p:nvSpPr>
-        <p:spPr>
-          <a:xfrm>
-            <a:off x="389224" y="1184204"/>
-            <a:ext cx="10872334" cy="5149219"/>
-          </a:xfrm>
-        </p:spPr>
-        <p:txBody>
-          <a:bodyPr>
-            <a:normAutofit fontScale="62500" lnSpcReduction="20000"/>
-          </a:bodyPr>
-          <a:lstStyle/>
-          <a:p>
-            <a:pPr marL="514350" indent="-514350">
-              <a:buFont typeface="+mj-lt"/>
-              <a:buAutoNum type="arabicPeriod"/>
-            </a:pPr>
-            <a:r>
-              <a:rPr lang="en-US" dirty="0"/>
-              <a:t>What category does this belong in? (Relational, Key-Value, Document, Graph, Columnar, Hybrid, Other)</a:t>
-            </a:r>
-          </a:p>
-          <a:p>
-            <a:pPr marL="514350" indent="-514350">
-              <a:buFont typeface="+mj-lt"/>
-              <a:buAutoNum type="arabicPeriod"/>
-            </a:pPr>
-            <a:r>
-              <a:rPr lang="en-US" dirty="0"/>
-              <a:t>What does this optimize on (i.e. do very well)? Reads, writes, transactions?</a:t>
-            </a:r>
-          </a:p>
-          <a:p>
-            <a:pPr marL="514350" indent="-514350">
-              <a:buFont typeface="+mj-lt"/>
-              <a:buAutoNum type="arabicPeriod"/>
-            </a:pPr>
-            <a:r>
-              <a:rPr lang="en-US" dirty="0"/>
-              <a:t>Is there a REST API? An SDK? Some native querying language?</a:t>
-            </a:r>
-          </a:p>
-          <a:p>
-            <a:pPr marL="514350" indent="-514350">
-              <a:buFont typeface="+mj-lt"/>
-              <a:buAutoNum type="arabicPeriod"/>
-            </a:pPr>
-            <a:r>
-              <a:rPr lang="en-US" dirty="0"/>
-              <a:t>Is the data format human readable: XML, JSON, etc. </a:t>
-            </a:r>
-          </a:p>
-          <a:p>
-            <a:pPr marL="514350" indent="-514350">
-              <a:buFont typeface="+mj-lt"/>
-              <a:buAutoNum type="arabicPeriod"/>
-            </a:pPr>
-            <a:r>
-              <a:rPr lang="en-US" dirty="0"/>
-              <a:t>Can it run on Windows? Linux? PAAS (Azure)?</a:t>
-            </a:r>
-          </a:p>
-          <a:p>
-            <a:pPr marL="514350" indent="-514350">
-              <a:buFont typeface="+mj-lt"/>
-              <a:buAutoNum type="arabicPeriod"/>
-            </a:pPr>
-            <a:r>
-              <a:rPr lang="en-US" dirty="0"/>
-              <a:t>Where does it fall on the CAP spectrum?</a:t>
-            </a:r>
-          </a:p>
-          <a:p>
-            <a:pPr marL="514350" indent="-514350">
-              <a:buFont typeface="+mj-lt"/>
-              <a:buAutoNum type="arabicPeriod"/>
-            </a:pPr>
-            <a:r>
-              <a:rPr lang="en-US" dirty="0"/>
-              <a:t>Auto-create database? Auto-create collections?</a:t>
-            </a:r>
-          </a:p>
-          <a:p>
-            <a:pPr marL="514350" indent="-514350">
-              <a:buFont typeface="+mj-lt"/>
-              <a:buAutoNum type="arabicPeriod"/>
-            </a:pPr>
-            <a:r>
-              <a:rPr lang="en-US" dirty="0"/>
-              <a:t>Is there a local mode?</a:t>
-            </a:r>
-          </a:p>
-          <a:p>
-            <a:pPr marL="514350" indent="-514350">
-              <a:buFont typeface="+mj-lt"/>
-              <a:buAutoNum type="arabicPeriod"/>
-            </a:pPr>
-            <a:r>
-              <a:rPr lang="en-US" dirty="0"/>
-              <a:t>Type of Indexing (Hash, B-tree, something else)</a:t>
-            </a:r>
-          </a:p>
-          <a:p>
-            <a:pPr marL="514350" indent="-514350">
-              <a:buFont typeface="+mj-lt"/>
-              <a:buAutoNum type="arabicPeriod"/>
-            </a:pPr>
-            <a:r>
-              <a:rPr lang="en-US" dirty="0"/>
-              <a:t>Does it support full-text search?</a:t>
-            </a:r>
-          </a:p>
-          <a:p>
-            <a:pPr marL="514350" indent="-514350">
-              <a:buFont typeface="+mj-lt"/>
-              <a:buAutoNum type="arabicPeriod"/>
-            </a:pPr>
-            <a:r>
-              <a:rPr lang="en-US" dirty="0"/>
-              <a:t>How does it scale? Support sharding?</a:t>
-            </a:r>
-          </a:p>
-          <a:p>
-            <a:pPr marL="514350" indent="-514350">
-              <a:buFont typeface="+mj-lt"/>
-              <a:buAutoNum type="arabicPeriod"/>
-            </a:pPr>
-            <a:r>
-              <a:rPr lang="en-US" dirty="0"/>
-              <a:t>How does it replicate? Master-slave or peer-peer?</a:t>
-            </a:r>
-          </a:p>
-          <a:p>
-            <a:pPr marL="514350" indent="-514350">
-              <a:buFont typeface="+mj-lt"/>
-              <a:buAutoNum type="arabicPeriod"/>
-            </a:pPr>
-            <a:r>
-              <a:rPr lang="en-US" dirty="0"/>
-              <a:t>Open Source?</a:t>
-            </a:r>
-          </a:p>
-          <a:p>
-            <a:pPr marL="514350" indent="-514350">
-              <a:buFont typeface="+mj-lt"/>
-              <a:buAutoNum type="arabicPeriod"/>
-            </a:pPr>
-            <a:r>
-              <a:rPr lang="en-US" dirty="0"/>
-              <a:t>Cost? If cloud based, how is this billed?</a:t>
-            </a:r>
-          </a:p>
-          <a:p>
-            <a:pPr marL="514350" indent="-514350">
-              <a:buFont typeface="+mj-lt"/>
-              <a:buAutoNum type="arabicPeriod"/>
-            </a:pPr>
-            <a:r>
-              <a:rPr lang="en-US" dirty="0"/>
-              <a:t>What kind of tooling is available? GUI based?</a:t>
-            </a:r>
-          </a:p>
-          <a:p>
-            <a:pPr marL="514350" indent="-514350">
-              <a:buFont typeface="+mj-lt"/>
-              <a:buAutoNum type="arabicPeriod"/>
-            </a:pPr>
-            <a:r>
-              <a:rPr lang="en-US" dirty="0"/>
-              <a:t>What are my options for technical support?</a:t>
-            </a:r>
-          </a:p>
-          <a:p>
-            <a:pPr marL="514350" indent="-514350">
-              <a:buFont typeface="+mj-lt"/>
-              <a:buAutoNum type="arabicPeriod"/>
-            </a:pPr>
-            <a:endParaRPr lang="en-US" dirty="0"/>
+              <a:t>SELECT * FROM sampletable;</a:t>
+            </a:r>
           </a:p>
         </p:txBody>
       </p:sp>
     </p:spTree>
     <p:extLst>
       <p:ext uri="{BB962C8B-B14F-4D97-AF65-F5344CB8AC3E}">
-        <p14:creationId xmlns:p14="http://schemas.microsoft.com/office/powerpoint/2010/main" val="2388893766"/>
+        <p14:creationId xmlns:p14="http://schemas.microsoft.com/office/powerpoint/2010/main" val="3971468642"/>
       </p:ext>
     </p:extLst>
   </p:cSld>
@@ -16715,202 +17003,229 @@
       </p:grpSpPr>
       <p:sp>
         <p:nvSpPr>
-          <p:cNvPr id="5" name="Rounded Rectangle 4"/>
-          <p:cNvSpPr/>
-          <p:nvPr/>
-        </p:nvSpPr>
-        <p:spPr>
-          <a:xfrm>
-            <a:off x="4210488" y="2367815"/>
-            <a:ext cx="3368842" cy="1299411"/>
-          </a:xfrm>
-          <a:prstGeom prst="roundRect">
-            <a:avLst/>
-          </a:prstGeom>
-          <a:effectLst>
-            <a:glow rad="63500">
-              <a:schemeClr val="accent1">
-                <a:satMod val="175000"/>
-                <a:alpha val="40000"/>
-              </a:schemeClr>
-            </a:glow>
-          </a:effectLst>
-        </p:spPr>
-        <p:style>
-          <a:lnRef idx="2">
-            <a:schemeClr val="accent1">
-              <a:shade val="50000"/>
-            </a:schemeClr>
-          </a:lnRef>
-          <a:fillRef idx="1">
-            <a:schemeClr val="accent1"/>
-          </a:fillRef>
-          <a:effectRef idx="0">
-            <a:schemeClr val="accent1"/>
-          </a:effectRef>
-          <a:fontRef idx="minor">
-            <a:schemeClr val="lt1"/>
-          </a:fontRef>
-        </p:style>
-        <p:txBody>
-          <a:bodyPr rtlCol="0" anchor="ctr"/>
-          <a:lstStyle/>
-          <a:p>
-            <a:pPr algn="ctr"/>
-            <a:r>
-              <a:rPr lang="en-US" sz="4400" dirty="0"/>
-              <a:t>Familiar</a:t>
-            </a:r>
-          </a:p>
-        </p:txBody>
-      </p:sp>
-      <p:sp>
-        <p:nvSpPr>
-          <p:cNvPr id="8" name="Rounded Rectangle 7"/>
-          <p:cNvSpPr/>
-          <p:nvPr/>
-        </p:nvSpPr>
-        <p:spPr>
-          <a:xfrm>
-            <a:off x="519764" y="4812632"/>
-            <a:ext cx="3627120" cy="1357162"/>
-          </a:xfrm>
-          <a:prstGeom prst="roundRect">
-            <a:avLst/>
-          </a:prstGeom>
-          <a:solidFill>
-            <a:schemeClr val="accent2">
-              <a:lumMod val="75000"/>
-            </a:schemeClr>
-          </a:solidFill>
-          <a:effectLst>
-            <a:glow rad="63500">
-              <a:schemeClr val="accent1">
-                <a:satMod val="175000"/>
-                <a:alpha val="40000"/>
-              </a:schemeClr>
-            </a:glow>
-          </a:effectLst>
-        </p:spPr>
-        <p:style>
-          <a:lnRef idx="2">
-            <a:schemeClr val="accent1">
-              <a:shade val="50000"/>
-            </a:schemeClr>
-          </a:lnRef>
-          <a:fillRef idx="1">
-            <a:schemeClr val="accent1"/>
-          </a:fillRef>
-          <a:effectRef idx="0">
-            <a:schemeClr val="accent1"/>
-          </a:effectRef>
-          <a:fontRef idx="minor">
-            <a:schemeClr val="lt1"/>
-          </a:fontRef>
-        </p:style>
-        <p:txBody>
-          <a:bodyPr rtlCol="0" anchor="ctr"/>
-          <a:lstStyle/>
-          <a:p>
-            <a:pPr algn="ctr"/>
-            <a:r>
-              <a:rPr lang="en-US" sz="4400" dirty="0"/>
-              <a:t>Transactional</a:t>
-            </a:r>
-          </a:p>
-        </p:txBody>
-      </p:sp>
-      <p:sp>
-        <p:nvSpPr>
-          <p:cNvPr id="9" name="Rounded Rectangle 8"/>
-          <p:cNvSpPr/>
-          <p:nvPr/>
-        </p:nvSpPr>
-        <p:spPr>
-          <a:xfrm>
-            <a:off x="7623208" y="4649003"/>
-            <a:ext cx="3397718" cy="1453413"/>
-          </a:xfrm>
-          <a:prstGeom prst="roundRect">
-            <a:avLst/>
-          </a:prstGeom>
-          <a:solidFill>
-            <a:srgbClr val="FF0000"/>
-          </a:solidFill>
-          <a:effectLst>
-            <a:glow rad="63500">
-              <a:schemeClr val="accent1">
-                <a:satMod val="175000"/>
-                <a:alpha val="40000"/>
-              </a:schemeClr>
-            </a:glow>
-          </a:effectLst>
-        </p:spPr>
-        <p:style>
-          <a:lnRef idx="2">
-            <a:schemeClr val="accent1">
-              <a:shade val="50000"/>
-            </a:schemeClr>
-          </a:lnRef>
-          <a:fillRef idx="1">
-            <a:schemeClr val="accent1"/>
-          </a:fillRef>
-          <a:effectRef idx="0">
-            <a:schemeClr val="accent1"/>
-          </a:effectRef>
-          <a:fontRef idx="minor">
-            <a:schemeClr val="lt1"/>
-          </a:fontRef>
-        </p:style>
-        <p:txBody>
-          <a:bodyPr rtlCol="0" anchor="ctr"/>
-          <a:lstStyle/>
-          <a:p>
-            <a:pPr algn="ctr"/>
-            <a:r>
-              <a:rPr lang="en-US" sz="4400" dirty="0"/>
-              <a:t>Sandboxed</a:t>
-            </a:r>
-          </a:p>
-        </p:txBody>
-      </p:sp>
-      <p:sp>
-        <p:nvSpPr>
-          <p:cNvPr id="10" name="TextBox 9"/>
-          <p:cNvSpPr txBox="1"/>
-          <p:nvPr/>
-        </p:nvSpPr>
-        <p:spPr>
-          <a:xfrm>
-            <a:off x="673768" y="370375"/>
-            <a:ext cx="10442282" cy="1015663"/>
-          </a:xfrm>
-          <a:prstGeom prst="rect">
-            <a:avLst/>
-          </a:prstGeom>
-          <a:noFill/>
-        </p:spPr>
-        <p:txBody>
-          <a:bodyPr wrap="none" rtlCol="0">
-            <a:spAutoFit/>
-          </a:bodyPr>
-          <a:lstStyle/>
-          <a:p>
-            <a:r>
-              <a:rPr lang="en-US" sz="6000" dirty="0">
+          <p:cNvPr id="2" name="Title 1"/>
+          <p:cNvSpPr>
+            <a:spLocks noGrp="1"/>
+          </p:cNvSpPr>
+          <p:nvPr>
+            <p:ph type="title"/>
+          </p:nvPr>
+        </p:nvSpPr>
+        <p:spPr>
+          <a:xfrm>
+            <a:off x="751572" y="176572"/>
+            <a:ext cx="3493168" cy="1007632"/>
+          </a:xfrm>
+        </p:spPr>
+        <p:txBody>
+          <a:bodyPr/>
+          <a:lstStyle/>
+          <a:p>
+            <a:r>
+              <a:rPr lang="en-US" b="1" dirty="0">
                 <a:solidFill>
                   <a:srgbClr val="FFFF00"/>
                 </a:solidFill>
               </a:rPr>
-              <a:t>Programmability in DocumentDB</a:t>
-            </a:r>
+              <a:t>The Checklist</a:t>
+            </a:r>
+          </a:p>
+        </p:txBody>
+      </p:sp>
+      <p:sp>
+        <p:nvSpPr>
+          <p:cNvPr id="3" name="Content Placeholder 2"/>
+          <p:cNvSpPr>
+            <a:spLocks noGrp="1"/>
+          </p:cNvSpPr>
+          <p:nvPr>
+            <p:ph idx="1"/>
+          </p:nvPr>
+        </p:nvSpPr>
+        <p:spPr>
+          <a:xfrm>
+            <a:off x="389224" y="1184204"/>
+            <a:ext cx="10872334" cy="5149219"/>
+          </a:xfrm>
+        </p:spPr>
+        <p:txBody>
+          <a:bodyPr>
+            <a:normAutofit fontScale="62500" lnSpcReduction="20000"/>
+          </a:bodyPr>
+          <a:lstStyle/>
+          <a:p>
+            <a:pPr marL="514350" indent="-514350">
+              <a:buFont typeface="+mj-lt"/>
+              <a:buAutoNum type="arabicPeriod"/>
+            </a:pPr>
+            <a:r>
+              <a:rPr lang="en-US" dirty="0"/>
+              <a:t>What category does this belong in? (Relational, Key-Value, Document, Graph, Columnar, Hybrid, Other)</a:t>
+            </a:r>
+          </a:p>
+          <a:p>
+            <a:pPr marL="514350" indent="-514350">
+              <a:buFont typeface="+mj-lt"/>
+              <a:buAutoNum type="arabicPeriod"/>
+            </a:pPr>
+            <a:r>
+              <a:rPr lang="en-US" dirty="0"/>
+              <a:t>What does this optimize on (i.e. do very well)? Reads, writes, transactions?</a:t>
+            </a:r>
+          </a:p>
+          <a:p>
+            <a:pPr marL="514350" indent="-514350">
+              <a:buFont typeface="+mj-lt"/>
+              <a:buAutoNum type="arabicPeriod"/>
+            </a:pPr>
+            <a:r>
+              <a:rPr lang="en-US" dirty="0"/>
+              <a:t>Is there a REST API? An SDK? Some native querying language?</a:t>
+            </a:r>
+          </a:p>
+          <a:p>
+            <a:pPr marL="514350" indent="-514350">
+              <a:buFont typeface="+mj-lt"/>
+              <a:buAutoNum type="arabicPeriod"/>
+            </a:pPr>
+            <a:r>
+              <a:rPr lang="en-US" dirty="0"/>
+              <a:t>Is the data format human readable: XML, JSON, etc. </a:t>
+            </a:r>
+          </a:p>
+          <a:p>
+            <a:pPr marL="514350" indent="-514350">
+              <a:buFont typeface="+mj-lt"/>
+              <a:buAutoNum type="arabicPeriod"/>
+            </a:pPr>
+            <a:r>
+              <a:rPr lang="en-US" dirty="0"/>
+              <a:t>Can it run on Windows? Linux? PAAS (Azure)?</a:t>
+            </a:r>
+          </a:p>
+          <a:p>
+            <a:pPr marL="514350" indent="-514350">
+              <a:buFont typeface="+mj-lt"/>
+              <a:buAutoNum type="arabicPeriod"/>
+            </a:pPr>
+            <a:r>
+              <a:rPr lang="en-US" dirty="0"/>
+              <a:t>Where does it fall on the CAP spectrum?</a:t>
+            </a:r>
+          </a:p>
+          <a:p>
+            <a:pPr marL="514350" indent="-514350">
+              <a:buFont typeface="+mj-lt"/>
+              <a:buAutoNum type="arabicPeriod"/>
+            </a:pPr>
+            <a:r>
+              <a:rPr lang="en-US" dirty="0"/>
+              <a:t>Auto-create database? Auto-create collections?</a:t>
+            </a:r>
+          </a:p>
+          <a:p>
+            <a:pPr marL="514350" indent="-514350">
+              <a:buFont typeface="+mj-lt"/>
+              <a:buAutoNum type="arabicPeriod"/>
+            </a:pPr>
+            <a:r>
+              <a:rPr lang="en-US" dirty="0"/>
+              <a:t>Is there a local mode?</a:t>
+            </a:r>
+          </a:p>
+          <a:p>
+            <a:pPr marL="514350" indent="-514350">
+              <a:buFont typeface="+mj-lt"/>
+              <a:buAutoNum type="arabicPeriod"/>
+            </a:pPr>
+            <a:r>
+              <a:rPr lang="en-US" dirty="0"/>
+              <a:t>Type of Indexing (Hash, B-tree, something else)</a:t>
+            </a:r>
+          </a:p>
+          <a:p>
+            <a:pPr marL="514350" indent="-514350">
+              <a:buFont typeface="+mj-lt"/>
+              <a:buAutoNum type="arabicPeriod"/>
+            </a:pPr>
+            <a:r>
+              <a:rPr lang="en-US" dirty="0"/>
+              <a:t>Does it support full-text search?</a:t>
+            </a:r>
+          </a:p>
+          <a:p>
+            <a:pPr marL="514350" indent="-514350">
+              <a:buFont typeface="+mj-lt"/>
+              <a:buAutoNum type="arabicPeriod"/>
+            </a:pPr>
+            <a:r>
+              <a:rPr lang="en-US" dirty="0"/>
+              <a:t>How does it scale? Support sharding?</a:t>
+            </a:r>
+          </a:p>
+          <a:p>
+            <a:pPr marL="514350" indent="-514350">
+              <a:buFont typeface="+mj-lt"/>
+              <a:buAutoNum type="arabicPeriod"/>
+            </a:pPr>
+            <a:r>
+              <a:rPr lang="en-US" dirty="0"/>
+              <a:t>How does it replicate? Master-slave or peer-peer?</a:t>
+            </a:r>
+          </a:p>
+          <a:p>
+            <a:pPr marL="514350" indent="-514350">
+              <a:buFont typeface="+mj-lt"/>
+              <a:buAutoNum type="arabicPeriod"/>
+            </a:pPr>
+            <a:r>
+              <a:rPr lang="en-US" dirty="0"/>
+              <a:t>Open Source?</a:t>
+            </a:r>
+          </a:p>
+          <a:p>
+            <a:pPr marL="514350" indent="-514350">
+              <a:buFont typeface="+mj-lt"/>
+              <a:buAutoNum type="arabicPeriod"/>
+            </a:pPr>
+            <a:r>
+              <a:rPr lang="en-US" dirty="0"/>
+              <a:t>Cost? If cloud based, how is this billed?</a:t>
+            </a:r>
+          </a:p>
+          <a:p>
+            <a:pPr marL="514350" indent="-514350">
+              <a:buFont typeface="+mj-lt"/>
+              <a:buAutoNum type="arabicPeriod"/>
+            </a:pPr>
+            <a:r>
+              <a:rPr lang="en-US" dirty="0"/>
+              <a:t>What kind of tooling is available? GUI based?</a:t>
+            </a:r>
+          </a:p>
+          <a:p>
+            <a:pPr marL="514350" indent="-514350">
+              <a:buFont typeface="+mj-lt"/>
+              <a:buAutoNum type="arabicPeriod"/>
+            </a:pPr>
+            <a:r>
+              <a:rPr lang="en-US" dirty="0"/>
+              <a:t>What are my options for technical support?</a:t>
+            </a:r>
+          </a:p>
+          <a:p>
+            <a:pPr marL="514350" indent="-514350">
+              <a:buFont typeface="+mj-lt"/>
+              <a:buAutoNum type="arabicPeriod"/>
+            </a:pPr>
+            <a:endParaRPr lang="en-US" dirty="0"/>
           </a:p>
         </p:txBody>
       </p:sp>
     </p:spTree>
     <p:extLst>
       <p:ext uri="{BB962C8B-B14F-4D97-AF65-F5344CB8AC3E}">
-        <p14:creationId xmlns:p14="http://schemas.microsoft.com/office/powerpoint/2010/main" val="3748666209"/>
+        <p14:creationId xmlns:p14="http://schemas.microsoft.com/office/powerpoint/2010/main" val="2388893766"/>
       </p:ext>
     </p:extLst>
   </p:cSld>
@@ -16939,6 +17254,230 @@
       </p:grpSpPr>
       <p:sp>
         <p:nvSpPr>
+          <p:cNvPr id="5" name="Rounded Rectangle 4"/>
+          <p:cNvSpPr/>
+          <p:nvPr/>
+        </p:nvSpPr>
+        <p:spPr>
+          <a:xfrm>
+            <a:off x="4210488" y="2367815"/>
+            <a:ext cx="3368842" cy="1299411"/>
+          </a:xfrm>
+          <a:prstGeom prst="roundRect">
+            <a:avLst/>
+          </a:prstGeom>
+          <a:effectLst>
+            <a:glow rad="63500">
+              <a:schemeClr val="accent1">
+                <a:satMod val="175000"/>
+                <a:alpha val="40000"/>
+              </a:schemeClr>
+            </a:glow>
+          </a:effectLst>
+        </p:spPr>
+        <p:style>
+          <a:lnRef idx="2">
+            <a:schemeClr val="accent1">
+              <a:shade val="50000"/>
+            </a:schemeClr>
+          </a:lnRef>
+          <a:fillRef idx="1">
+            <a:schemeClr val="accent1"/>
+          </a:fillRef>
+          <a:effectRef idx="0">
+            <a:schemeClr val="accent1"/>
+          </a:effectRef>
+          <a:fontRef idx="minor">
+            <a:schemeClr val="lt1"/>
+          </a:fontRef>
+        </p:style>
+        <p:txBody>
+          <a:bodyPr rtlCol="0" anchor="ctr"/>
+          <a:lstStyle/>
+          <a:p>
+            <a:pPr algn="ctr"/>
+            <a:r>
+              <a:rPr lang="en-US" sz="4400" dirty="0"/>
+              <a:t>Familiar</a:t>
+            </a:r>
+          </a:p>
+        </p:txBody>
+      </p:sp>
+      <p:sp>
+        <p:nvSpPr>
+          <p:cNvPr id="8" name="Rounded Rectangle 7"/>
+          <p:cNvSpPr/>
+          <p:nvPr/>
+        </p:nvSpPr>
+        <p:spPr>
+          <a:xfrm>
+            <a:off x="519764" y="4812632"/>
+            <a:ext cx="3627120" cy="1357162"/>
+          </a:xfrm>
+          <a:prstGeom prst="roundRect">
+            <a:avLst/>
+          </a:prstGeom>
+          <a:solidFill>
+            <a:schemeClr val="accent2">
+              <a:lumMod val="75000"/>
+            </a:schemeClr>
+          </a:solidFill>
+          <a:effectLst>
+            <a:glow rad="63500">
+              <a:schemeClr val="accent1">
+                <a:satMod val="175000"/>
+                <a:alpha val="40000"/>
+              </a:schemeClr>
+            </a:glow>
+          </a:effectLst>
+        </p:spPr>
+        <p:style>
+          <a:lnRef idx="2">
+            <a:schemeClr val="accent1">
+              <a:shade val="50000"/>
+            </a:schemeClr>
+          </a:lnRef>
+          <a:fillRef idx="1">
+            <a:schemeClr val="accent1"/>
+          </a:fillRef>
+          <a:effectRef idx="0">
+            <a:schemeClr val="accent1"/>
+          </a:effectRef>
+          <a:fontRef idx="minor">
+            <a:schemeClr val="lt1"/>
+          </a:fontRef>
+        </p:style>
+        <p:txBody>
+          <a:bodyPr rtlCol="0" anchor="ctr"/>
+          <a:lstStyle/>
+          <a:p>
+            <a:pPr algn="ctr"/>
+            <a:r>
+              <a:rPr lang="en-US" sz="4400" dirty="0"/>
+              <a:t>Transactional</a:t>
+            </a:r>
+          </a:p>
+        </p:txBody>
+      </p:sp>
+      <p:sp>
+        <p:nvSpPr>
+          <p:cNvPr id="9" name="Rounded Rectangle 8"/>
+          <p:cNvSpPr/>
+          <p:nvPr/>
+        </p:nvSpPr>
+        <p:spPr>
+          <a:xfrm>
+            <a:off x="7623208" y="4649003"/>
+            <a:ext cx="3397718" cy="1453413"/>
+          </a:xfrm>
+          <a:prstGeom prst="roundRect">
+            <a:avLst/>
+          </a:prstGeom>
+          <a:solidFill>
+            <a:srgbClr val="FF0000"/>
+          </a:solidFill>
+          <a:effectLst>
+            <a:glow rad="63500">
+              <a:schemeClr val="accent1">
+                <a:satMod val="175000"/>
+                <a:alpha val="40000"/>
+              </a:schemeClr>
+            </a:glow>
+          </a:effectLst>
+        </p:spPr>
+        <p:style>
+          <a:lnRef idx="2">
+            <a:schemeClr val="accent1">
+              <a:shade val="50000"/>
+            </a:schemeClr>
+          </a:lnRef>
+          <a:fillRef idx="1">
+            <a:schemeClr val="accent1"/>
+          </a:fillRef>
+          <a:effectRef idx="0">
+            <a:schemeClr val="accent1"/>
+          </a:effectRef>
+          <a:fontRef idx="minor">
+            <a:schemeClr val="lt1"/>
+          </a:fontRef>
+        </p:style>
+        <p:txBody>
+          <a:bodyPr rtlCol="0" anchor="ctr"/>
+          <a:lstStyle/>
+          <a:p>
+            <a:pPr algn="ctr"/>
+            <a:r>
+              <a:rPr lang="en-US" sz="4400" dirty="0"/>
+              <a:t>Sandboxed</a:t>
+            </a:r>
+          </a:p>
+        </p:txBody>
+      </p:sp>
+      <p:sp>
+        <p:nvSpPr>
+          <p:cNvPr id="10" name="TextBox 9"/>
+          <p:cNvSpPr txBox="1"/>
+          <p:nvPr/>
+        </p:nvSpPr>
+        <p:spPr>
+          <a:xfrm>
+            <a:off x="673768" y="370375"/>
+            <a:ext cx="10442282" cy="1015663"/>
+          </a:xfrm>
+          <a:prstGeom prst="rect">
+            <a:avLst/>
+          </a:prstGeom>
+          <a:noFill/>
+        </p:spPr>
+        <p:txBody>
+          <a:bodyPr wrap="none" rtlCol="0">
+            <a:spAutoFit/>
+          </a:bodyPr>
+          <a:lstStyle/>
+          <a:p>
+            <a:r>
+              <a:rPr lang="en-US" sz="6000" dirty="0">
+                <a:solidFill>
+                  <a:srgbClr val="FFFF00"/>
+                </a:solidFill>
+              </a:rPr>
+              <a:t>Programmability in DocumentDB</a:t>
+            </a:r>
+          </a:p>
+        </p:txBody>
+      </p:sp>
+    </p:spTree>
+    <p:extLst>
+      <p:ext uri="{BB962C8B-B14F-4D97-AF65-F5344CB8AC3E}">
+        <p14:creationId xmlns:p14="http://schemas.microsoft.com/office/powerpoint/2010/main" val="3748666209"/>
+      </p:ext>
+    </p:extLst>
+  </p:cSld>
+  <p:clrMapOvr>
+    <a:masterClrMapping/>
+  </p:clrMapOvr>
+</p:sld>
+</file>
+
+<file path=ppt/slides/slide47.xml><?xml version="1.0" encoding="utf-8"?>
+<p:sld xmlns:a="http://schemas.openxmlformats.org/drawingml/2006/main" xmlns:r="http://schemas.openxmlformats.org/officeDocument/2006/relationships" xmlns:p="http://schemas.openxmlformats.org/presentationml/2006/main">
+  <p:cSld>
+    <p:spTree>
+      <p:nvGrpSpPr>
+        <p:cNvPr id="1" name=""/>
+        <p:cNvGrpSpPr/>
+        <p:nvPr/>
+      </p:nvGrpSpPr>
+      <p:grpSpPr>
+        <a:xfrm>
+          <a:off x="0" y="0"/>
+          <a:ext cx="0" cy="0"/>
+          <a:chOff x="0" y="0"/>
+          <a:chExt cx="0" cy="0"/>
+        </a:xfrm>
+      </p:grpSpPr>
+      <p:sp>
+        <p:nvSpPr>
           <p:cNvPr id="4" name="TextBox 3"/>
           <p:cNvSpPr txBox="1"/>
           <p:nvPr/>
@@ -17191,7 +17730,7 @@
 </p:sld>
 </file>
 
-<file path=ppt/slides/slide47.xml><?xml version="1.0" encoding="utf-8"?>
+<file path=ppt/slides/slide48.xml><?xml version="1.0" encoding="utf-8"?>
 <p:sld xmlns:a="http://schemas.openxmlformats.org/drawingml/2006/main" xmlns:r="http://schemas.openxmlformats.org/officeDocument/2006/relationships" xmlns:p="http://schemas.openxmlformats.org/presentationml/2006/main">
   <p:cSld>
     <p:spTree>
@@ -18362,7 +18901,7 @@
 </p:sld>
 </file>
 
-<file path=ppt/slides/slide48.xml><?xml version="1.0" encoding="utf-8"?>
+<file path=ppt/slides/slide49.xml><?xml version="1.0" encoding="utf-8"?>
 <p:sld xmlns:a="http://schemas.openxmlformats.org/drawingml/2006/main" xmlns:r="http://schemas.openxmlformats.org/officeDocument/2006/relationships" xmlns:p="http://schemas.openxmlformats.org/presentationml/2006/main">
   <p:cSld>
     <p:spTree>
@@ -19541,7 +20080,235 @@
 </p:sld>
 </file>
 
-<file path=ppt/slides/slide49.xml><?xml version="1.0" encoding="utf-8"?>
+<file path=ppt/slides/slide5.xml><?xml version="1.0" encoding="utf-8"?>
+<p:sld xmlns:a="http://schemas.openxmlformats.org/drawingml/2006/main" xmlns:r="http://schemas.openxmlformats.org/officeDocument/2006/relationships" xmlns:p="http://schemas.openxmlformats.org/presentationml/2006/main">
+  <p:cSld>
+    <p:spTree>
+      <p:nvGrpSpPr>
+        <p:cNvPr id="1" name=""/>
+        <p:cNvGrpSpPr/>
+        <p:nvPr/>
+      </p:nvGrpSpPr>
+      <p:grpSpPr>
+        <a:xfrm>
+          <a:off x="0" y="0"/>
+          <a:ext cx="0" cy="0"/>
+          <a:chOff x="0" y="0"/>
+          <a:chExt cx="0" cy="0"/>
+        </a:xfrm>
+      </p:grpSpPr>
+      <p:sp>
+        <p:nvSpPr>
+          <p:cNvPr id="4" name="Rectangle 3"/>
+          <p:cNvSpPr/>
+          <p:nvPr/>
+        </p:nvSpPr>
+        <p:spPr>
+          <a:xfrm>
+            <a:off x="1529345" y="1465006"/>
+            <a:ext cx="1887794" cy="2035278"/>
+          </a:xfrm>
+          <a:prstGeom prst="rect">
+            <a:avLst/>
+          </a:prstGeom>
+          <a:gradFill flip="none" rotWithShape="1">
+            <a:gsLst>
+              <a:gs pos="0">
+                <a:schemeClr val="accent1">
+                  <a:lumMod val="50000"/>
+                  <a:shade val="30000"/>
+                  <a:satMod val="115000"/>
+                </a:schemeClr>
+              </a:gs>
+              <a:gs pos="50000">
+                <a:schemeClr val="accent1">
+                  <a:lumMod val="50000"/>
+                  <a:shade val="67500"/>
+                  <a:satMod val="115000"/>
+                </a:schemeClr>
+              </a:gs>
+              <a:gs pos="100000">
+                <a:schemeClr val="accent1">
+                  <a:lumMod val="50000"/>
+                  <a:shade val="100000"/>
+                  <a:satMod val="115000"/>
+                </a:schemeClr>
+              </a:gs>
+            </a:gsLst>
+            <a:lin ang="5400000" scaled="1"/>
+            <a:tileRect/>
+          </a:gradFill>
+        </p:spPr>
+        <p:style>
+          <a:lnRef idx="2">
+            <a:schemeClr val="accent1">
+              <a:shade val="50000"/>
+            </a:schemeClr>
+          </a:lnRef>
+          <a:fillRef idx="1">
+            <a:schemeClr val="accent1"/>
+          </a:fillRef>
+          <a:effectRef idx="0">
+            <a:schemeClr val="accent1"/>
+          </a:effectRef>
+          <a:fontRef idx="minor">
+            <a:schemeClr val="lt1"/>
+          </a:fontRef>
+        </p:style>
+        <p:txBody>
+          <a:bodyPr rtlCol="0" anchor="ctr"/>
+          <a:lstStyle/>
+          <a:p>
+            <a:pPr algn="ctr"/>
+            <a:r>
+              <a:rPr lang="en-US" sz="3200" dirty="0"/>
+              <a:t>Products</a:t>
+            </a:r>
+          </a:p>
+        </p:txBody>
+      </p:sp>
+      <p:sp>
+        <p:nvSpPr>
+          <p:cNvPr id="5" name="Rectangle 4"/>
+          <p:cNvSpPr/>
+          <p:nvPr/>
+        </p:nvSpPr>
+        <p:spPr>
+          <a:xfrm>
+            <a:off x="5530644" y="1465006"/>
+            <a:ext cx="1887794" cy="2035278"/>
+          </a:xfrm>
+          <a:prstGeom prst="rect">
+            <a:avLst/>
+          </a:prstGeom>
+          <a:gradFill flip="none" rotWithShape="1">
+            <a:gsLst>
+              <a:gs pos="0">
+                <a:schemeClr val="accent6">
+                  <a:lumMod val="75000"/>
+                  <a:shade val="30000"/>
+                  <a:satMod val="115000"/>
+                </a:schemeClr>
+              </a:gs>
+              <a:gs pos="50000">
+                <a:schemeClr val="accent6">
+                  <a:lumMod val="75000"/>
+                  <a:shade val="67500"/>
+                  <a:satMod val="115000"/>
+                </a:schemeClr>
+              </a:gs>
+              <a:gs pos="100000">
+                <a:schemeClr val="accent6">
+                  <a:lumMod val="75000"/>
+                  <a:shade val="100000"/>
+                  <a:satMod val="115000"/>
+                </a:schemeClr>
+              </a:gs>
+            </a:gsLst>
+            <a:lin ang="5400000" scaled="1"/>
+            <a:tileRect/>
+          </a:gradFill>
+        </p:spPr>
+        <p:style>
+          <a:lnRef idx="2">
+            <a:schemeClr val="accent1">
+              <a:shade val="50000"/>
+            </a:schemeClr>
+          </a:lnRef>
+          <a:fillRef idx="1">
+            <a:schemeClr val="accent1"/>
+          </a:fillRef>
+          <a:effectRef idx="0">
+            <a:schemeClr val="accent1"/>
+          </a:effectRef>
+          <a:fontRef idx="minor">
+            <a:schemeClr val="lt1"/>
+          </a:fontRef>
+        </p:style>
+        <p:txBody>
+          <a:bodyPr rtlCol="0" anchor="ctr"/>
+          <a:lstStyle/>
+          <a:p>
+            <a:pPr algn="ctr"/>
+            <a:r>
+              <a:rPr lang="en-US" sz="3200" dirty="0"/>
+              <a:t>Reviews</a:t>
+            </a:r>
+          </a:p>
+        </p:txBody>
+      </p:sp>
+      <p:sp>
+        <p:nvSpPr>
+          <p:cNvPr id="6" name="TextBox 5"/>
+          <p:cNvSpPr txBox="1"/>
+          <p:nvPr/>
+        </p:nvSpPr>
+        <p:spPr>
+          <a:xfrm>
+            <a:off x="1529345" y="3755923"/>
+            <a:ext cx="1603516" cy="369332"/>
+          </a:xfrm>
+          <a:prstGeom prst="rect">
+            <a:avLst/>
+          </a:prstGeom>
+          <a:noFill/>
+        </p:spPr>
+        <p:txBody>
+          <a:bodyPr wrap="none" rtlCol="0">
+            <a:spAutoFit/>
+          </a:bodyPr>
+          <a:lstStyle/>
+          <a:p>
+            <a:r>
+              <a:rPr lang="en-US" dirty="0"/>
+              <a:t>Store as strings</a:t>
+            </a:r>
+          </a:p>
+        </p:txBody>
+      </p:sp>
+      <p:sp>
+        <p:nvSpPr>
+          <p:cNvPr id="7" name="TextBox 6"/>
+          <p:cNvSpPr txBox="1"/>
+          <p:nvPr/>
+        </p:nvSpPr>
+        <p:spPr>
+          <a:xfrm>
+            <a:off x="5530644" y="3755923"/>
+            <a:ext cx="2063706" cy="369332"/>
+          </a:xfrm>
+          <a:prstGeom prst="rect">
+            <a:avLst/>
+          </a:prstGeom>
+          <a:noFill/>
+        </p:spPr>
+        <p:txBody>
+          <a:bodyPr wrap="none" rtlCol="0">
+            <a:spAutoFit/>
+          </a:bodyPr>
+          <a:lstStyle/>
+          <a:p>
+            <a:r>
+              <a:rPr lang="en-US" dirty="0"/>
+              <a:t>List of last 5 reviews</a:t>
+            </a:r>
+          </a:p>
+        </p:txBody>
+      </p:sp>
+    </p:spTree>
+    <p:extLst>
+      <p:ext uri="{BB962C8B-B14F-4D97-AF65-F5344CB8AC3E}">
+        <p14:creationId xmlns:p14="http://schemas.microsoft.com/office/powerpoint/2010/main" val="3017650262"/>
+      </p:ext>
+    </p:extLst>
+  </p:cSld>
+  <p:clrMapOvr>
+    <a:masterClrMapping/>
+  </p:clrMapOvr>
+</p:sld>
+</file>
+
+<file path=ppt/slides/slide50.xml><?xml version="1.0" encoding="utf-8"?>
 <p:sld xmlns:a="http://schemas.openxmlformats.org/drawingml/2006/main" xmlns:r="http://schemas.openxmlformats.org/officeDocument/2006/relationships" xmlns:p="http://schemas.openxmlformats.org/presentationml/2006/main">
   <p:cSld>
     <p:spTree>
@@ -20721,235 +21488,7 @@
 </p:sld>
 </file>
 
-<file path=ppt/slides/slide5.xml><?xml version="1.0" encoding="utf-8"?>
-<p:sld xmlns:a="http://schemas.openxmlformats.org/drawingml/2006/main" xmlns:r="http://schemas.openxmlformats.org/officeDocument/2006/relationships" xmlns:p="http://schemas.openxmlformats.org/presentationml/2006/main">
-  <p:cSld>
-    <p:spTree>
-      <p:nvGrpSpPr>
-        <p:cNvPr id="1" name=""/>
-        <p:cNvGrpSpPr/>
-        <p:nvPr/>
-      </p:nvGrpSpPr>
-      <p:grpSpPr>
-        <a:xfrm>
-          <a:off x="0" y="0"/>
-          <a:ext cx="0" cy="0"/>
-          <a:chOff x="0" y="0"/>
-          <a:chExt cx="0" cy="0"/>
-        </a:xfrm>
-      </p:grpSpPr>
-      <p:sp>
-        <p:nvSpPr>
-          <p:cNvPr id="4" name="Rectangle 3"/>
-          <p:cNvSpPr/>
-          <p:nvPr/>
-        </p:nvSpPr>
-        <p:spPr>
-          <a:xfrm>
-            <a:off x="1529345" y="1465006"/>
-            <a:ext cx="1887794" cy="2035278"/>
-          </a:xfrm>
-          <a:prstGeom prst="rect">
-            <a:avLst/>
-          </a:prstGeom>
-          <a:gradFill flip="none" rotWithShape="1">
-            <a:gsLst>
-              <a:gs pos="0">
-                <a:schemeClr val="accent1">
-                  <a:lumMod val="50000"/>
-                  <a:shade val="30000"/>
-                  <a:satMod val="115000"/>
-                </a:schemeClr>
-              </a:gs>
-              <a:gs pos="50000">
-                <a:schemeClr val="accent1">
-                  <a:lumMod val="50000"/>
-                  <a:shade val="67500"/>
-                  <a:satMod val="115000"/>
-                </a:schemeClr>
-              </a:gs>
-              <a:gs pos="100000">
-                <a:schemeClr val="accent1">
-                  <a:lumMod val="50000"/>
-                  <a:shade val="100000"/>
-                  <a:satMod val="115000"/>
-                </a:schemeClr>
-              </a:gs>
-            </a:gsLst>
-            <a:lin ang="5400000" scaled="1"/>
-            <a:tileRect/>
-          </a:gradFill>
-        </p:spPr>
-        <p:style>
-          <a:lnRef idx="2">
-            <a:schemeClr val="accent1">
-              <a:shade val="50000"/>
-            </a:schemeClr>
-          </a:lnRef>
-          <a:fillRef idx="1">
-            <a:schemeClr val="accent1"/>
-          </a:fillRef>
-          <a:effectRef idx="0">
-            <a:schemeClr val="accent1"/>
-          </a:effectRef>
-          <a:fontRef idx="minor">
-            <a:schemeClr val="lt1"/>
-          </a:fontRef>
-        </p:style>
-        <p:txBody>
-          <a:bodyPr rtlCol="0" anchor="ctr"/>
-          <a:lstStyle/>
-          <a:p>
-            <a:pPr algn="ctr"/>
-            <a:r>
-              <a:rPr lang="en-US" sz="3200" dirty="0"/>
-              <a:t>Products</a:t>
-            </a:r>
-          </a:p>
-        </p:txBody>
-      </p:sp>
-      <p:sp>
-        <p:nvSpPr>
-          <p:cNvPr id="5" name="Rectangle 4"/>
-          <p:cNvSpPr/>
-          <p:nvPr/>
-        </p:nvSpPr>
-        <p:spPr>
-          <a:xfrm>
-            <a:off x="5530644" y="1465006"/>
-            <a:ext cx="1887794" cy="2035278"/>
-          </a:xfrm>
-          <a:prstGeom prst="rect">
-            <a:avLst/>
-          </a:prstGeom>
-          <a:gradFill flip="none" rotWithShape="1">
-            <a:gsLst>
-              <a:gs pos="0">
-                <a:schemeClr val="accent6">
-                  <a:lumMod val="75000"/>
-                  <a:shade val="30000"/>
-                  <a:satMod val="115000"/>
-                </a:schemeClr>
-              </a:gs>
-              <a:gs pos="50000">
-                <a:schemeClr val="accent6">
-                  <a:lumMod val="75000"/>
-                  <a:shade val="67500"/>
-                  <a:satMod val="115000"/>
-                </a:schemeClr>
-              </a:gs>
-              <a:gs pos="100000">
-                <a:schemeClr val="accent6">
-                  <a:lumMod val="75000"/>
-                  <a:shade val="100000"/>
-                  <a:satMod val="115000"/>
-                </a:schemeClr>
-              </a:gs>
-            </a:gsLst>
-            <a:lin ang="5400000" scaled="1"/>
-            <a:tileRect/>
-          </a:gradFill>
-        </p:spPr>
-        <p:style>
-          <a:lnRef idx="2">
-            <a:schemeClr val="accent1">
-              <a:shade val="50000"/>
-            </a:schemeClr>
-          </a:lnRef>
-          <a:fillRef idx="1">
-            <a:schemeClr val="accent1"/>
-          </a:fillRef>
-          <a:effectRef idx="0">
-            <a:schemeClr val="accent1"/>
-          </a:effectRef>
-          <a:fontRef idx="minor">
-            <a:schemeClr val="lt1"/>
-          </a:fontRef>
-        </p:style>
-        <p:txBody>
-          <a:bodyPr rtlCol="0" anchor="ctr"/>
-          <a:lstStyle/>
-          <a:p>
-            <a:pPr algn="ctr"/>
-            <a:r>
-              <a:rPr lang="en-US" sz="3200" dirty="0"/>
-              <a:t>Reviews</a:t>
-            </a:r>
-          </a:p>
-        </p:txBody>
-      </p:sp>
-      <p:sp>
-        <p:nvSpPr>
-          <p:cNvPr id="6" name="TextBox 5"/>
-          <p:cNvSpPr txBox="1"/>
-          <p:nvPr/>
-        </p:nvSpPr>
-        <p:spPr>
-          <a:xfrm>
-            <a:off x="1529345" y="3755923"/>
-            <a:ext cx="1603516" cy="369332"/>
-          </a:xfrm>
-          <a:prstGeom prst="rect">
-            <a:avLst/>
-          </a:prstGeom>
-          <a:noFill/>
-        </p:spPr>
-        <p:txBody>
-          <a:bodyPr wrap="none" rtlCol="0">
-            <a:spAutoFit/>
-          </a:bodyPr>
-          <a:lstStyle/>
-          <a:p>
-            <a:r>
-              <a:rPr lang="en-US" dirty="0"/>
-              <a:t>Store as strings</a:t>
-            </a:r>
-          </a:p>
-        </p:txBody>
-      </p:sp>
-      <p:sp>
-        <p:nvSpPr>
-          <p:cNvPr id="7" name="TextBox 6"/>
-          <p:cNvSpPr txBox="1"/>
-          <p:nvPr/>
-        </p:nvSpPr>
-        <p:spPr>
-          <a:xfrm>
-            <a:off x="5530644" y="3755923"/>
-            <a:ext cx="2063706" cy="369332"/>
-          </a:xfrm>
-          <a:prstGeom prst="rect">
-            <a:avLst/>
-          </a:prstGeom>
-          <a:noFill/>
-        </p:spPr>
-        <p:txBody>
-          <a:bodyPr wrap="none" rtlCol="0">
-            <a:spAutoFit/>
-          </a:bodyPr>
-          <a:lstStyle/>
-          <a:p>
-            <a:r>
-              <a:rPr lang="en-US" dirty="0"/>
-              <a:t>List of last 5 reviews</a:t>
-            </a:r>
-          </a:p>
-        </p:txBody>
-      </p:sp>
-    </p:spTree>
-    <p:extLst>
-      <p:ext uri="{BB962C8B-B14F-4D97-AF65-F5344CB8AC3E}">
-        <p14:creationId xmlns:p14="http://schemas.microsoft.com/office/powerpoint/2010/main" val="3017650262"/>
-      </p:ext>
-    </p:extLst>
-  </p:cSld>
-  <p:clrMapOvr>
-    <a:masterClrMapping/>
-  </p:clrMapOvr>
-</p:sld>
-</file>
-
-<file path=ppt/slides/slide50.xml><?xml version="1.0" encoding="utf-8"?>
+<file path=ppt/slides/slide51.xml><?xml version="1.0" encoding="utf-8"?>
 <p:sld xmlns:a="http://schemas.openxmlformats.org/drawingml/2006/main" xmlns:r="http://schemas.openxmlformats.org/officeDocument/2006/relationships" xmlns:p="http://schemas.openxmlformats.org/presentationml/2006/main">
   <p:cSld>
     <p:spTree>
@@ -22135,36 +22674,6 @@
 </p:sld>
 </file>
 
-<file path=ppt/slides/slide51.xml><?xml version="1.0" encoding="utf-8"?>
-<p:sld xmlns:a="http://schemas.openxmlformats.org/drawingml/2006/main" xmlns:r="http://schemas.openxmlformats.org/officeDocument/2006/relationships" xmlns:p="http://schemas.openxmlformats.org/presentationml/2006/main">
-  <p:cSld>
-    <p:spTree>
-      <p:nvGrpSpPr>
-        <p:cNvPr id="1" name=""/>
-        <p:cNvGrpSpPr/>
-        <p:nvPr/>
-      </p:nvGrpSpPr>
-      <p:grpSpPr>
-        <a:xfrm>
-          <a:off x="0" y="0"/>
-          <a:ext cx="0" cy="0"/>
-          <a:chOff x="0" y="0"/>
-          <a:chExt cx="0" cy="0"/>
-        </a:xfrm>
-      </p:grpSpPr>
-    </p:spTree>
-    <p:extLst>
-      <p:ext uri="{BB962C8B-B14F-4D97-AF65-F5344CB8AC3E}">
-        <p14:creationId xmlns:p14="http://schemas.microsoft.com/office/powerpoint/2010/main" val="3955733258"/>
-      </p:ext>
-    </p:extLst>
-  </p:cSld>
-  <p:clrMapOvr>
-    <a:masterClrMapping/>
-  </p:clrMapOvr>
-</p:sld>
-</file>
-
 <file path=ppt/slides/slide52.xml><?xml version="1.0" encoding="utf-8"?>
 <p:sld xmlns:a="http://schemas.openxmlformats.org/drawingml/2006/main" xmlns:r="http://schemas.openxmlformats.org/officeDocument/2006/relationships" xmlns:p="http://schemas.openxmlformats.org/presentationml/2006/main">
   <p:cSld>
@@ -22843,7 +23352,7 @@
           <a:noFill/>
           <a:extLst>
             <a:ext uri="{909E8E84-426E-40dd-AFC4-6F175D3DCCD1}">
-              <a14:hiddenFill xmlns:a14="http://schemas.microsoft.com/office/drawing/2010/main" xmlns="">
+              <a14:hiddenFill xmlns="" xmlns:a14="http://schemas.microsoft.com/office/drawing/2010/main">
                 <a:solidFill>
                   <a:srgbClr val="FFFFFF"/>
                 </a:solidFill>
@@ -23015,7 +23524,7 @@
           <a:noFill/>
           <a:extLst>
             <a:ext uri="{909E8E84-426E-40dd-AFC4-6F175D3DCCD1}">
-              <a14:hiddenFill xmlns:a14="http://schemas.microsoft.com/office/drawing/2010/main" xmlns="">
+              <a14:hiddenFill xmlns="" xmlns:a14="http://schemas.microsoft.com/office/drawing/2010/main">
                 <a:solidFill>
                   <a:srgbClr val="FFFFFF"/>
                 </a:solidFill>

</xml_diff>

<commit_message>
Updating assets, walkthru and Ne04J folder arrangement
</commit_message>
<xml_diff>
--- a/NoSQLWhirlwind supprting images.pptx
+++ b/NoSQLWhirlwind supprting images.pptx
@@ -359,7 +359,7 @@
           <a:p>
             <a:fld id="{09204D5E-80CA-44E6-9838-6D2C437BFBFD}" type="datetimeFigureOut">
               <a:rPr lang="en-US" smtClean="0"/>
-              <a:t>4/3/2016</a:t>
+              <a:t>4/7/2016</a:t>
             </a:fld>
             <a:endParaRPr lang="en-US"/>
           </a:p>
@@ -2133,7 +2133,7 @@
           <a:p>
             <a:fld id="{7D161F0C-C389-4F4C-A9F9-4D86F194D20A}" type="datetimeFigureOut">
               <a:rPr lang="en-US" smtClean="0"/>
-              <a:t>4/3/2016</a:t>
+              <a:t>4/7/2016</a:t>
             </a:fld>
             <a:endParaRPr lang="en-US"/>
           </a:p>
@@ -2303,7 +2303,7 @@
           <a:p>
             <a:fld id="{7D161F0C-C389-4F4C-A9F9-4D86F194D20A}" type="datetimeFigureOut">
               <a:rPr lang="en-US" smtClean="0"/>
-              <a:t>4/3/2016</a:t>
+              <a:t>4/7/2016</a:t>
             </a:fld>
             <a:endParaRPr lang="en-US"/>
           </a:p>
@@ -2483,7 +2483,7 @@
           <a:p>
             <a:fld id="{7D161F0C-C389-4F4C-A9F9-4D86F194D20A}" type="datetimeFigureOut">
               <a:rPr lang="en-US" smtClean="0"/>
-              <a:t>4/3/2016</a:t>
+              <a:t>4/7/2016</a:t>
             </a:fld>
             <a:endParaRPr lang="en-US"/>
           </a:p>
@@ -2653,7 +2653,7 @@
           <a:p>
             <a:fld id="{7D161F0C-C389-4F4C-A9F9-4D86F194D20A}" type="datetimeFigureOut">
               <a:rPr lang="en-US" smtClean="0"/>
-              <a:t>4/3/2016</a:t>
+              <a:t>4/7/2016</a:t>
             </a:fld>
             <a:endParaRPr lang="en-US"/>
           </a:p>
@@ -2899,7 +2899,7 @@
           <a:p>
             <a:fld id="{7D161F0C-C389-4F4C-A9F9-4D86F194D20A}" type="datetimeFigureOut">
               <a:rPr lang="en-US" smtClean="0"/>
-              <a:t>4/3/2016</a:t>
+              <a:t>4/7/2016</a:t>
             </a:fld>
             <a:endParaRPr lang="en-US"/>
           </a:p>
@@ -3131,7 +3131,7 @@
           <a:p>
             <a:fld id="{7D161F0C-C389-4F4C-A9F9-4D86F194D20A}" type="datetimeFigureOut">
               <a:rPr lang="en-US" smtClean="0"/>
-              <a:t>4/3/2016</a:t>
+              <a:t>4/7/2016</a:t>
             </a:fld>
             <a:endParaRPr lang="en-US"/>
           </a:p>
@@ -3498,7 +3498,7 @@
           <a:p>
             <a:fld id="{7D161F0C-C389-4F4C-A9F9-4D86F194D20A}" type="datetimeFigureOut">
               <a:rPr lang="en-US" smtClean="0"/>
-              <a:t>4/3/2016</a:t>
+              <a:t>4/7/2016</a:t>
             </a:fld>
             <a:endParaRPr lang="en-US"/>
           </a:p>
@@ -3616,7 +3616,7 @@
           <a:p>
             <a:fld id="{7D161F0C-C389-4F4C-A9F9-4D86F194D20A}" type="datetimeFigureOut">
               <a:rPr lang="en-US" smtClean="0"/>
-              <a:t>4/3/2016</a:t>
+              <a:t>4/7/2016</a:t>
             </a:fld>
             <a:endParaRPr lang="en-US"/>
           </a:p>
@@ -3711,7 +3711,7 @@
           <a:p>
             <a:fld id="{7D161F0C-C389-4F4C-A9F9-4D86F194D20A}" type="datetimeFigureOut">
               <a:rPr lang="en-US" smtClean="0"/>
-              <a:t>4/3/2016</a:t>
+              <a:t>4/7/2016</a:t>
             </a:fld>
             <a:endParaRPr lang="en-US"/>
           </a:p>
@@ -3988,7 +3988,7 @@
           <a:p>
             <a:fld id="{7D161F0C-C389-4F4C-A9F9-4D86F194D20A}" type="datetimeFigureOut">
               <a:rPr lang="en-US" smtClean="0"/>
-              <a:t>4/3/2016</a:t>
+              <a:t>4/7/2016</a:t>
             </a:fld>
             <a:endParaRPr lang="en-US"/>
           </a:p>
@@ -4245,7 +4245,7 @@
           <a:p>
             <a:fld id="{7D161F0C-C389-4F4C-A9F9-4D86F194D20A}" type="datetimeFigureOut">
               <a:rPr lang="en-US" smtClean="0"/>
-              <a:t>4/3/2016</a:t>
+              <a:t>4/7/2016</a:t>
             </a:fld>
             <a:endParaRPr lang="en-US"/>
           </a:p>
@@ -4458,7 +4458,7 @@
           <a:p>
             <a:fld id="{7D161F0C-C389-4F4C-A9F9-4D86F194D20A}" type="datetimeFigureOut">
               <a:rPr lang="en-US" smtClean="0"/>
-              <a:t>4/3/2016</a:t>
+              <a:t>4/7/2016</a:t>
             </a:fld>
             <a:endParaRPr lang="en-US"/>
           </a:p>
@@ -6608,14 +6608,14 @@
           </a:effectLst>
           <a:extLst>
             <a:ext uri="{909E8E84-426E-40dd-AFC4-6F175D3DCCD1}">
-              <a14:hiddenFill xmlns:a14="http://schemas.microsoft.com/office/drawing/2010/main" xmlns="">
+              <a14:hiddenFill xmlns="" xmlns:a14="http://schemas.microsoft.com/office/drawing/2010/main">
                 <a:solidFill>
                   <a:schemeClr val="accent1"/>
                 </a:solidFill>
               </a14:hiddenFill>
             </a:ext>
             <a:ext uri="{91240B29-F687-4f45-9708-019B960494DF}">
-              <a14:hiddenLine xmlns:a14="http://schemas.microsoft.com/office/drawing/2010/main" xmlns="" w="9525">
+              <a14:hiddenLine xmlns="" xmlns:a14="http://schemas.microsoft.com/office/drawing/2010/main" w="9525">
                 <a:solidFill>
                   <a:schemeClr val="tx1"/>
                 </a:solidFill>
@@ -6726,13 +6726,13 @@
           <a:p>
             <a:r>
               <a:rPr lang="en-US" dirty="0"/>
-              <a:t>    "Title": "What's new in MongoDB 2.4",</a:t>
+              <a:t>    "Title": "What's new in MongoDB 3.2",</a:t>
             </a:r>
           </a:p>
           <a:p>
             <a:r>
               <a:rPr lang="en-US" dirty="0"/>
-              <a:t>    "Content" : "MongoDB 2.4 represents hundreds of  improvements and features driven 	         by user requests...",</a:t>
+              <a:t>    "Content" : "MongoDB 3.2 represents hundreds of  improvements and features driven 	         by user requests...",</a:t>
             </a:r>
           </a:p>
           <a:p>
@@ -7110,14 +7110,14 @@
           </a:ln>
           <a:extLst>
             <a:ext uri="{909E8E84-426E-40dd-AFC4-6F175D3DCCD1}">
-              <a14:hiddenFill xmlns:a14="http://schemas.microsoft.com/office/drawing/2010/main" xmlns="">
+              <a14:hiddenFill xmlns="" xmlns:a14="http://schemas.microsoft.com/office/drawing/2010/main">
                 <a:solidFill>
                   <a:schemeClr val="accent1"/>
                 </a:solidFill>
               </a14:hiddenFill>
             </a:ext>
             <a:ext uri="{91240B29-F687-4f45-9708-019B960494DF}">
-              <a14:hiddenLine xmlns:a14="http://schemas.microsoft.com/office/drawing/2010/main" xmlns="" w="9525">
+              <a14:hiddenLine xmlns="" xmlns:a14="http://schemas.microsoft.com/office/drawing/2010/main" w="9525">
                 <a:solidFill>
                   <a:schemeClr val="tx1"/>
                 </a:solidFill>
@@ -23352,7 +23352,7 @@
           <a:noFill/>
           <a:extLst>
             <a:ext uri="{909E8E84-426E-40dd-AFC4-6F175D3DCCD1}">
-              <a14:hiddenFill xmlns="" xmlns:a14="http://schemas.microsoft.com/office/drawing/2010/main">
+              <a14:hiddenFill xmlns:a14="http://schemas.microsoft.com/office/drawing/2010/main" xmlns="">
                 <a:solidFill>
                   <a:srgbClr val="FFFFFF"/>
                 </a:solidFill>
@@ -23524,7 +23524,7 @@
           <a:noFill/>
           <a:extLst>
             <a:ext uri="{909E8E84-426E-40dd-AFC4-6F175D3DCCD1}">
-              <a14:hiddenFill xmlns="" xmlns:a14="http://schemas.microsoft.com/office/drawing/2010/main">
+              <a14:hiddenFill xmlns:a14="http://schemas.microsoft.com/office/drawing/2010/main" xmlns="">
                 <a:solidFill>
                   <a:srgbClr val="FFFFFF"/>
                 </a:solidFill>

</xml_diff>